<commit_message>
Finish slides before 5/19/16 presentation
</commit_message>
<xml_diff>
--- a/A Primer on Functional Programming.pptx
+++ b/A Primer on Functional Programming.pptx
@@ -6,7 +6,7 @@
     <p:sldMasterId id="2147483674" r:id="rId3"/>
   </p:sldMasterIdLst>
   <p:notesMasterIdLst>
-    <p:notesMasterId r:id="rId9"/>
+    <p:notesMasterId r:id="rId32"/>
   </p:notesMasterIdLst>
   <p:sldIdLst>
     <p:sldId id="257" r:id="rId4"/>
@@ -14,6 +14,29 @@
     <p:sldId id="259" r:id="rId6"/>
     <p:sldId id="260" r:id="rId7"/>
     <p:sldId id="261" r:id="rId8"/>
+    <p:sldId id="262" r:id="rId9"/>
+    <p:sldId id="263" r:id="rId10"/>
+    <p:sldId id="264" r:id="rId11"/>
+    <p:sldId id="265" r:id="rId12"/>
+    <p:sldId id="266" r:id="rId13"/>
+    <p:sldId id="267" r:id="rId14"/>
+    <p:sldId id="268" r:id="rId15"/>
+    <p:sldId id="269" r:id="rId16"/>
+    <p:sldId id="270" r:id="rId17"/>
+    <p:sldId id="271" r:id="rId18"/>
+    <p:sldId id="272" r:id="rId19"/>
+    <p:sldId id="273" r:id="rId20"/>
+    <p:sldId id="274" r:id="rId21"/>
+    <p:sldId id="275" r:id="rId22"/>
+    <p:sldId id="276" r:id="rId23"/>
+    <p:sldId id="277" r:id="rId24"/>
+    <p:sldId id="278" r:id="rId25"/>
+    <p:sldId id="279" r:id="rId26"/>
+    <p:sldId id="280" r:id="rId27"/>
+    <p:sldId id="281" r:id="rId28"/>
+    <p:sldId id="282" r:id="rId29"/>
+    <p:sldId id="283" r:id="rId30"/>
+    <p:sldId id="284" r:id="rId31"/>
   </p:sldIdLst>
   <p:sldSz cx="9144000" cy="6858000" type="screen4x3"/>
   <p:notesSz cx="6858000" cy="9144000"/>
@@ -213,7 +236,7 @@
           <a:p>
             <a:fld id="{D499C1BB-0018-4F91-BF83-7408753661FD}" type="datetimeFigureOut">
               <a:rPr lang="en-US" smtClean="0"/>
-              <a:t>5/18/2016</a:t>
+              <a:t>5/19/2016</a:t>
             </a:fld>
             <a:endParaRPr lang="en-US"/>
           </a:p>
@@ -570,7 +593,7 @@
             <a:fld id="{81331B57-0BE5-4F82-AA58-76F53EFF3ADA}" type="datetime8">
               <a:rPr lang="en-US" smtClean="0"/>
               <a:pPr/>
-              <a:t>5/18/2016 10:08 PM</a:t>
+              <a:t>5/19/2016 8:44 AM</a:t>
             </a:fld>
             <a:endParaRPr lang="en-US" dirty="0"/>
           </a:p>
@@ -4437,6 +4460,1328 @@
 </p:sld>
 </file>
 
+<file path=ppt/slides/slide10.xml><?xml version="1.0" encoding="utf-8"?>
+<p:sld xmlns:a="http://schemas.openxmlformats.org/drawingml/2006/main" xmlns:r="http://schemas.openxmlformats.org/officeDocument/2006/relationships" xmlns:p="http://schemas.openxmlformats.org/presentationml/2006/main">
+  <p:cSld>
+    <p:spTree>
+      <p:nvGrpSpPr>
+        <p:cNvPr id="1" name=""/>
+        <p:cNvGrpSpPr/>
+        <p:nvPr/>
+      </p:nvGrpSpPr>
+      <p:grpSpPr>
+        <a:xfrm>
+          <a:off x="0" y="0"/>
+          <a:ext cx="0" cy="0"/>
+          <a:chOff x="0" y="0"/>
+          <a:chExt cx="0" cy="0"/>
+        </a:xfrm>
+      </p:grpSpPr>
+      <p:sp>
+        <p:nvSpPr>
+          <p:cNvPr id="2" name="Title 1"/>
+          <p:cNvSpPr>
+            <a:spLocks noGrp="1"/>
+          </p:cNvSpPr>
+          <p:nvPr>
+            <p:ph type="title"/>
+          </p:nvPr>
+        </p:nvSpPr>
+        <p:spPr/>
+        <p:txBody>
+          <a:bodyPr/>
+          <a:lstStyle/>
+          <a:p>
+            <a:r>
+              <a:rPr lang="en-US" dirty="0" smtClean="0"/>
+              <a:t>Explaining Functional Programming</a:t>
+            </a:r>
+            <a:endParaRPr lang="en-US" dirty="0"/>
+          </a:p>
+        </p:txBody>
+      </p:sp>
+      <p:sp>
+        <p:nvSpPr>
+          <p:cNvPr id="3" name="Content Placeholder 2"/>
+          <p:cNvSpPr>
+            <a:spLocks noGrp="1"/>
+          </p:cNvSpPr>
+          <p:nvPr>
+            <p:ph idx="1"/>
+          </p:nvPr>
+        </p:nvSpPr>
+        <p:spPr>
+          <a:xfrm>
+            <a:off x="381000" y="1412875"/>
+            <a:ext cx="8382000" cy="4087273"/>
+          </a:xfrm>
+        </p:spPr>
+        <p:txBody>
+          <a:bodyPr/>
+          <a:lstStyle/>
+          <a:p>
+            <a:r>
+              <a:rPr lang="en-US" dirty="0" smtClean="0"/>
+              <a:t>Functions ARE values</a:t>
+            </a:r>
+          </a:p>
+          <a:p>
+            <a:r>
+              <a:rPr lang="en-US" dirty="0" smtClean="0"/>
+              <a:t>Functions can be passed as values into functions</a:t>
+            </a:r>
+            <a:br>
+              <a:rPr lang="en-US" dirty="0" smtClean="0"/>
+            </a:br>
+            <a:r>
+              <a:rPr lang="en-US" sz="2400" dirty="0" smtClean="0"/>
+              <a:t/>
+            </a:r>
+            <a:br>
+              <a:rPr lang="en-US" sz="2400" dirty="0" smtClean="0"/>
+            </a:br>
+            <a:r>
+              <a:rPr lang="en-US" sz="2400" dirty="0" err="1" smtClean="0"/>
+              <a:t>def</a:t>
+            </a:r>
+            <a:r>
+              <a:rPr lang="en-US" sz="2400" dirty="0" smtClean="0"/>
+              <a:t> divide(x, y):</a:t>
+            </a:r>
+            <a:br>
+              <a:rPr lang="en-US" sz="2400" dirty="0" smtClean="0"/>
+            </a:br>
+            <a:r>
+              <a:rPr lang="en-US" sz="2400" dirty="0" smtClean="0"/>
+              <a:t>    return x/y</a:t>
+            </a:r>
+            <a:br>
+              <a:rPr lang="en-US" sz="2400" dirty="0" smtClean="0"/>
+            </a:br>
+            <a:r>
+              <a:rPr lang="en-US" sz="2400" dirty="0" smtClean="0"/>
+              <a:t/>
+            </a:r>
+            <a:br>
+              <a:rPr lang="en-US" sz="2400" dirty="0" smtClean="0"/>
+            </a:br>
+            <a:r>
+              <a:rPr lang="en-US" sz="2400" dirty="0" err="1" smtClean="0"/>
+              <a:t>def</a:t>
+            </a:r>
+            <a:r>
+              <a:rPr lang="en-US" sz="2400" dirty="0" smtClean="0"/>
+              <a:t> divisor(d):</a:t>
+            </a:r>
+            <a:br>
+              <a:rPr lang="en-US" sz="2400" dirty="0" smtClean="0"/>
+            </a:br>
+            <a:r>
+              <a:rPr lang="en-US" sz="2400" dirty="0" smtClean="0"/>
+              <a:t>    return lambda x: divide (x, d)</a:t>
+            </a:r>
+            <a:br>
+              <a:rPr lang="en-US" sz="2400" dirty="0" smtClean="0"/>
+            </a:br>
+            <a:r>
+              <a:rPr lang="en-US" sz="2400" dirty="0" smtClean="0"/>
+              <a:t/>
+            </a:r>
+            <a:br>
+              <a:rPr lang="en-US" sz="2400" dirty="0" smtClean="0"/>
+            </a:br>
+            <a:r>
+              <a:rPr lang="en-US" sz="2400" dirty="0" smtClean="0"/>
+              <a:t>half = divisor(2)</a:t>
+            </a:r>
+            <a:br>
+              <a:rPr lang="en-US" sz="2400" dirty="0" smtClean="0"/>
+            </a:br>
+            <a:r>
+              <a:rPr lang="en-US" sz="2400" dirty="0" smtClean="0"/>
+              <a:t>print half(32)</a:t>
+            </a:r>
+            <a:endParaRPr lang="en-US" dirty="0" smtClean="0"/>
+          </a:p>
+        </p:txBody>
+      </p:sp>
+    </p:spTree>
+    <p:extLst>
+      <p:ext uri="{BB962C8B-B14F-4D97-AF65-F5344CB8AC3E}">
+        <p14:creationId xmlns:p14="http://schemas.microsoft.com/office/powerpoint/2010/main" val="475278678"/>
+      </p:ext>
+    </p:extLst>
+  </p:cSld>
+  <p:clrMapOvr>
+    <a:masterClrMapping/>
+  </p:clrMapOvr>
+  <p:transition>
+    <p:fade/>
+  </p:transition>
+</p:sld>
+</file>
+
+<file path=ppt/slides/slide11.xml><?xml version="1.0" encoding="utf-8"?>
+<p:sld xmlns:a="http://schemas.openxmlformats.org/drawingml/2006/main" xmlns:r="http://schemas.openxmlformats.org/officeDocument/2006/relationships" xmlns:p="http://schemas.openxmlformats.org/presentationml/2006/main">
+  <p:cSld>
+    <p:spTree>
+      <p:nvGrpSpPr>
+        <p:cNvPr id="1" name=""/>
+        <p:cNvGrpSpPr/>
+        <p:nvPr/>
+      </p:nvGrpSpPr>
+      <p:grpSpPr>
+        <a:xfrm>
+          <a:off x="0" y="0"/>
+          <a:ext cx="0" cy="0"/>
+          <a:chOff x="0" y="0"/>
+          <a:chExt cx="0" cy="0"/>
+        </a:xfrm>
+      </p:grpSpPr>
+      <p:sp>
+        <p:nvSpPr>
+          <p:cNvPr id="2" name="Title 1"/>
+          <p:cNvSpPr>
+            <a:spLocks noGrp="1"/>
+          </p:cNvSpPr>
+          <p:nvPr>
+            <p:ph type="title"/>
+          </p:nvPr>
+        </p:nvSpPr>
+        <p:spPr/>
+        <p:txBody>
+          <a:bodyPr/>
+          <a:lstStyle/>
+          <a:p>
+            <a:r>
+              <a:rPr lang="en-US" dirty="0" smtClean="0"/>
+              <a:t>Explaining Functional Programming</a:t>
+            </a:r>
+            <a:endParaRPr lang="en-US" dirty="0"/>
+          </a:p>
+        </p:txBody>
+      </p:sp>
+      <p:sp>
+        <p:nvSpPr>
+          <p:cNvPr id="3" name="Content Placeholder 2"/>
+          <p:cNvSpPr>
+            <a:spLocks noGrp="1"/>
+          </p:cNvSpPr>
+          <p:nvPr>
+            <p:ph idx="1"/>
+          </p:nvPr>
+        </p:nvSpPr>
+        <p:spPr>
+          <a:xfrm>
+            <a:off x="381000" y="1412875"/>
+            <a:ext cx="8382000" cy="2406813"/>
+          </a:xfrm>
+        </p:spPr>
+        <p:txBody>
+          <a:bodyPr/>
+          <a:lstStyle/>
+          <a:p>
+            <a:r>
+              <a:rPr lang="en-US" dirty="0" smtClean="0"/>
+              <a:t>There’s more!</a:t>
+            </a:r>
+          </a:p>
+          <a:p>
+            <a:pPr lvl="1"/>
+            <a:r>
+              <a:rPr lang="en-US" dirty="0" smtClean="0"/>
+              <a:t>Monads</a:t>
+            </a:r>
+          </a:p>
+          <a:p>
+            <a:pPr lvl="1"/>
+            <a:r>
+              <a:rPr lang="en-US" dirty="0" smtClean="0"/>
+              <a:t>Closures</a:t>
+            </a:r>
+          </a:p>
+          <a:p>
+            <a:pPr lvl="1"/>
+            <a:r>
+              <a:rPr lang="en-US" dirty="0" err="1" smtClean="0"/>
+              <a:t>Functors</a:t>
+            </a:r>
+            <a:endParaRPr lang="en-US" dirty="0" smtClean="0"/>
+          </a:p>
+          <a:p>
+            <a:r>
+              <a:rPr lang="en-US" dirty="0" smtClean="0"/>
+              <a:t>Outside of the scope of today</a:t>
+            </a:r>
+            <a:endParaRPr lang="en-US" dirty="0"/>
+          </a:p>
+        </p:txBody>
+      </p:sp>
+    </p:spTree>
+    <p:extLst>
+      <p:ext uri="{BB962C8B-B14F-4D97-AF65-F5344CB8AC3E}">
+        <p14:creationId xmlns:p14="http://schemas.microsoft.com/office/powerpoint/2010/main" val="3484673725"/>
+      </p:ext>
+    </p:extLst>
+  </p:cSld>
+  <p:clrMapOvr>
+    <a:masterClrMapping/>
+  </p:clrMapOvr>
+  <p:transition>
+    <p:fade/>
+  </p:transition>
+</p:sld>
+</file>
+
+<file path=ppt/slides/slide12.xml><?xml version="1.0" encoding="utf-8"?>
+<p:sld xmlns:a="http://schemas.openxmlformats.org/drawingml/2006/main" xmlns:r="http://schemas.openxmlformats.org/officeDocument/2006/relationships" xmlns:p="http://schemas.openxmlformats.org/presentationml/2006/main">
+  <p:cSld>
+    <p:spTree>
+      <p:nvGrpSpPr>
+        <p:cNvPr id="1" name=""/>
+        <p:cNvGrpSpPr/>
+        <p:nvPr/>
+      </p:nvGrpSpPr>
+      <p:grpSpPr>
+        <a:xfrm>
+          <a:off x="0" y="0"/>
+          <a:ext cx="0" cy="0"/>
+          <a:chOff x="0" y="0"/>
+          <a:chExt cx="0" cy="0"/>
+        </a:xfrm>
+      </p:grpSpPr>
+      <p:sp>
+        <p:nvSpPr>
+          <p:cNvPr id="2" name="Title 1"/>
+          <p:cNvSpPr>
+            <a:spLocks noGrp="1"/>
+          </p:cNvSpPr>
+          <p:nvPr>
+            <p:ph type="title"/>
+          </p:nvPr>
+        </p:nvSpPr>
+        <p:spPr/>
+        <p:txBody>
+          <a:bodyPr/>
+          <a:lstStyle/>
+          <a:p>
+            <a:r>
+              <a:rPr lang="en-US" dirty="0" smtClean="0"/>
+              <a:t>Why Use Functional Languages?</a:t>
+            </a:r>
+            <a:endParaRPr lang="en-US" dirty="0"/>
+          </a:p>
+        </p:txBody>
+      </p:sp>
+      <p:sp>
+        <p:nvSpPr>
+          <p:cNvPr id="3" name="Content Placeholder 2"/>
+          <p:cNvSpPr>
+            <a:spLocks noGrp="1"/>
+          </p:cNvSpPr>
+          <p:nvPr>
+            <p:ph idx="1"/>
+          </p:nvPr>
+        </p:nvSpPr>
+        <p:spPr>
+          <a:xfrm>
+            <a:off x="381000" y="1412875"/>
+            <a:ext cx="8382000" cy="2640723"/>
+          </a:xfrm>
+        </p:spPr>
+        <p:txBody>
+          <a:bodyPr/>
+          <a:lstStyle/>
+          <a:p>
+            <a:r>
+              <a:rPr lang="en-US" dirty="0" smtClean="0"/>
+              <a:t>Usually simpler and faster</a:t>
+            </a:r>
+          </a:p>
+          <a:p>
+            <a:pPr lvl="1"/>
+            <a:r>
+              <a:rPr lang="en-US" dirty="0" smtClean="0"/>
+              <a:t>Take less time to write</a:t>
+            </a:r>
+          </a:p>
+          <a:p>
+            <a:pPr lvl="1"/>
+            <a:r>
+              <a:rPr lang="en-US" dirty="0" smtClean="0"/>
+              <a:t>If it’s a pure function, and you verified it’s right, it will always be right</a:t>
+            </a:r>
+          </a:p>
+          <a:p>
+            <a:pPr lvl="1"/>
+            <a:r>
+              <a:rPr lang="en-US" dirty="0" smtClean="0"/>
+              <a:t>Stack traces are a pain, but in FP they simplify things</a:t>
+            </a:r>
+          </a:p>
+        </p:txBody>
+      </p:sp>
+    </p:spTree>
+    <p:extLst>
+      <p:ext uri="{BB962C8B-B14F-4D97-AF65-F5344CB8AC3E}">
+        <p14:creationId xmlns:p14="http://schemas.microsoft.com/office/powerpoint/2010/main" val="302425659"/>
+      </p:ext>
+    </p:extLst>
+  </p:cSld>
+  <p:clrMapOvr>
+    <a:masterClrMapping/>
+  </p:clrMapOvr>
+  <p:transition>
+    <p:fade/>
+  </p:transition>
+</p:sld>
+</file>
+
+<file path=ppt/slides/slide13.xml><?xml version="1.0" encoding="utf-8"?>
+<p:sld xmlns:a="http://schemas.openxmlformats.org/drawingml/2006/main" xmlns:r="http://schemas.openxmlformats.org/officeDocument/2006/relationships" xmlns:p="http://schemas.openxmlformats.org/presentationml/2006/main">
+  <p:cSld>
+    <p:spTree>
+      <p:nvGrpSpPr>
+        <p:cNvPr id="1" name=""/>
+        <p:cNvGrpSpPr/>
+        <p:nvPr/>
+      </p:nvGrpSpPr>
+      <p:grpSpPr>
+        <a:xfrm>
+          <a:off x="0" y="0"/>
+          <a:ext cx="0" cy="0"/>
+          <a:chOff x="0" y="0"/>
+          <a:chExt cx="0" cy="0"/>
+        </a:xfrm>
+      </p:grpSpPr>
+      <p:sp>
+        <p:nvSpPr>
+          <p:cNvPr id="2" name="Title 1"/>
+          <p:cNvSpPr>
+            <a:spLocks noGrp="1"/>
+          </p:cNvSpPr>
+          <p:nvPr>
+            <p:ph type="title"/>
+          </p:nvPr>
+        </p:nvSpPr>
+        <p:spPr/>
+        <p:txBody>
+          <a:bodyPr/>
+          <a:lstStyle/>
+          <a:p>
+            <a:r>
+              <a:rPr lang="en-US" dirty="0" smtClean="0"/>
+              <a:t>Why Use Functional Languages?</a:t>
+            </a:r>
+            <a:endParaRPr lang="en-US" dirty="0"/>
+          </a:p>
+        </p:txBody>
+      </p:sp>
+      <p:sp>
+        <p:nvSpPr>
+          <p:cNvPr id="3" name="Content Placeholder 2"/>
+          <p:cNvSpPr>
+            <a:spLocks noGrp="1"/>
+          </p:cNvSpPr>
+          <p:nvPr>
+            <p:ph idx="1"/>
+          </p:nvPr>
+        </p:nvSpPr>
+        <p:spPr>
+          <a:xfrm>
+            <a:off x="381000" y="1412875"/>
+            <a:ext cx="8382000" cy="3028521"/>
+          </a:xfrm>
+        </p:spPr>
+        <p:txBody>
+          <a:bodyPr/>
+          <a:lstStyle/>
+          <a:p>
+            <a:r>
+              <a:rPr lang="en-US" dirty="0" smtClean="0"/>
+              <a:t>Functions are easier to test</a:t>
+            </a:r>
+          </a:p>
+          <a:p>
+            <a:pPr lvl="1"/>
+            <a:r>
+              <a:rPr lang="en-US" dirty="0" smtClean="0"/>
+              <a:t>How many have written unit tests that fail because of some state change?</a:t>
+            </a:r>
+          </a:p>
+          <a:p>
+            <a:pPr lvl="1"/>
+            <a:r>
+              <a:rPr lang="en-US" dirty="0" smtClean="0"/>
+              <a:t>Pure functions will ALWAYS pass tests because they always return the same results with same input</a:t>
+            </a:r>
+          </a:p>
+          <a:p>
+            <a:pPr lvl="1"/>
+            <a:r>
+              <a:rPr lang="en-US" dirty="0" smtClean="0"/>
+              <a:t>Global state of program isn’t affected by pure functions</a:t>
+            </a:r>
+          </a:p>
+        </p:txBody>
+      </p:sp>
+    </p:spTree>
+    <p:extLst>
+      <p:ext uri="{BB962C8B-B14F-4D97-AF65-F5344CB8AC3E}">
+        <p14:creationId xmlns:p14="http://schemas.microsoft.com/office/powerpoint/2010/main" val="3656736461"/>
+      </p:ext>
+    </p:extLst>
+  </p:cSld>
+  <p:clrMapOvr>
+    <a:masterClrMapping/>
+  </p:clrMapOvr>
+  <p:transition>
+    <p:fade/>
+  </p:transition>
+</p:sld>
+</file>
+
+<file path=ppt/slides/slide14.xml><?xml version="1.0" encoding="utf-8"?>
+<p:sld xmlns:a="http://schemas.openxmlformats.org/drawingml/2006/main" xmlns:r="http://schemas.openxmlformats.org/officeDocument/2006/relationships" xmlns:p="http://schemas.openxmlformats.org/presentationml/2006/main">
+  <p:cSld>
+    <p:spTree>
+      <p:nvGrpSpPr>
+        <p:cNvPr id="1" name=""/>
+        <p:cNvGrpSpPr/>
+        <p:nvPr/>
+      </p:nvGrpSpPr>
+      <p:grpSpPr>
+        <a:xfrm>
+          <a:off x="0" y="0"/>
+          <a:ext cx="0" cy="0"/>
+          <a:chOff x="0" y="0"/>
+          <a:chExt cx="0" cy="0"/>
+        </a:xfrm>
+      </p:grpSpPr>
+      <p:sp>
+        <p:nvSpPr>
+          <p:cNvPr id="2" name="Title 1"/>
+          <p:cNvSpPr>
+            <a:spLocks noGrp="1"/>
+          </p:cNvSpPr>
+          <p:nvPr>
+            <p:ph type="title"/>
+          </p:nvPr>
+        </p:nvSpPr>
+        <p:spPr/>
+        <p:txBody>
+          <a:bodyPr/>
+          <a:lstStyle/>
+          <a:p>
+            <a:r>
+              <a:rPr lang="en-US" dirty="0" smtClean="0"/>
+              <a:t>Why Use Functional Languages?</a:t>
+            </a:r>
+            <a:endParaRPr lang="en-US" dirty="0"/>
+          </a:p>
+        </p:txBody>
+      </p:sp>
+      <p:sp>
+        <p:nvSpPr>
+          <p:cNvPr id="3" name="Content Placeholder 2"/>
+          <p:cNvSpPr>
+            <a:spLocks noGrp="1"/>
+          </p:cNvSpPr>
+          <p:nvPr>
+            <p:ph idx="1"/>
+          </p:nvPr>
+        </p:nvSpPr>
+        <p:spPr>
+          <a:xfrm>
+            <a:off x="381000" y="1412875"/>
+            <a:ext cx="8382000" cy="3779496"/>
+          </a:xfrm>
+        </p:spPr>
+        <p:txBody>
+          <a:bodyPr/>
+          <a:lstStyle/>
+          <a:p>
+            <a:r>
+              <a:rPr lang="en-US" dirty="0" err="1" smtClean="0"/>
+              <a:t>Concurency</a:t>
+            </a:r>
+            <a:r>
+              <a:rPr lang="en-US" dirty="0" smtClean="0"/>
+              <a:t> is WAY easier</a:t>
+            </a:r>
+          </a:p>
+          <a:p>
+            <a:pPr lvl="1"/>
+            <a:r>
+              <a:rPr lang="en-US" dirty="0" smtClean="0"/>
+              <a:t>Functions work well as independent units</a:t>
+            </a:r>
+          </a:p>
+          <a:p>
+            <a:pPr lvl="1"/>
+            <a:r>
+              <a:rPr lang="en-US" dirty="0" smtClean="0"/>
+              <a:t>They don’t have side effects</a:t>
+            </a:r>
+          </a:p>
+          <a:p>
+            <a:pPr lvl="1"/>
+            <a:r>
+              <a:rPr lang="en-US" dirty="0" smtClean="0"/>
+              <a:t>Multiple functions can run simultaneously without affecting each other</a:t>
+            </a:r>
+          </a:p>
+          <a:p>
+            <a:r>
+              <a:rPr lang="en-US" dirty="0" smtClean="0"/>
+              <a:t>Code ends up better as functions are designed better</a:t>
+            </a:r>
+          </a:p>
+          <a:p>
+            <a:pPr lvl="1"/>
+            <a:r>
+              <a:rPr lang="en-US" dirty="0" smtClean="0"/>
+              <a:t>Better small modules -&gt; better large modules</a:t>
+            </a:r>
+          </a:p>
+        </p:txBody>
+      </p:sp>
+    </p:spTree>
+    <p:extLst>
+      <p:ext uri="{BB962C8B-B14F-4D97-AF65-F5344CB8AC3E}">
+        <p14:creationId xmlns:p14="http://schemas.microsoft.com/office/powerpoint/2010/main" val="1842549892"/>
+      </p:ext>
+    </p:extLst>
+  </p:cSld>
+  <p:clrMapOvr>
+    <a:masterClrMapping/>
+  </p:clrMapOvr>
+  <p:transition>
+    <p:fade/>
+  </p:transition>
+</p:sld>
+</file>
+
+<file path=ppt/slides/slide15.xml><?xml version="1.0" encoding="utf-8"?>
+<p:sld xmlns:a="http://schemas.openxmlformats.org/drawingml/2006/main" xmlns:r="http://schemas.openxmlformats.org/officeDocument/2006/relationships" xmlns:p="http://schemas.openxmlformats.org/presentationml/2006/main">
+  <p:cSld>
+    <p:spTree>
+      <p:nvGrpSpPr>
+        <p:cNvPr id="1" name=""/>
+        <p:cNvGrpSpPr/>
+        <p:nvPr/>
+      </p:nvGrpSpPr>
+      <p:grpSpPr>
+        <a:xfrm>
+          <a:off x="0" y="0"/>
+          <a:ext cx="0" cy="0"/>
+          <a:chOff x="0" y="0"/>
+          <a:chExt cx="0" cy="0"/>
+        </a:xfrm>
+      </p:grpSpPr>
+      <p:sp>
+        <p:nvSpPr>
+          <p:cNvPr id="2" name="Title 1"/>
+          <p:cNvSpPr>
+            <a:spLocks noGrp="1"/>
+          </p:cNvSpPr>
+          <p:nvPr>
+            <p:ph type="title"/>
+          </p:nvPr>
+        </p:nvSpPr>
+        <p:spPr/>
+        <p:txBody>
+          <a:bodyPr/>
+          <a:lstStyle/>
+          <a:p>
+            <a:r>
+              <a:rPr lang="en-US" dirty="0" smtClean="0"/>
+              <a:t>Example of Functional Thinking</a:t>
+            </a:r>
+            <a:endParaRPr lang="en-US" dirty="0"/>
+          </a:p>
+        </p:txBody>
+      </p:sp>
+      <p:sp>
+        <p:nvSpPr>
+          <p:cNvPr id="3" name="Content Placeholder 2"/>
+          <p:cNvSpPr>
+            <a:spLocks noGrp="1"/>
+          </p:cNvSpPr>
+          <p:nvPr>
+            <p:ph idx="1"/>
+          </p:nvPr>
+        </p:nvSpPr>
+        <p:spPr>
+          <a:xfrm>
+            <a:off x="381000" y="1412875"/>
+            <a:ext cx="8382000" cy="1865126"/>
+          </a:xfrm>
+        </p:spPr>
+        <p:txBody>
+          <a:bodyPr/>
+          <a:lstStyle/>
+          <a:p>
+            <a:r>
+              <a:rPr lang="en-US" dirty="0" smtClean="0"/>
+              <a:t>Activity 1:</a:t>
+            </a:r>
+          </a:p>
+          <a:p>
+            <a:pPr lvl="1"/>
+            <a:r>
+              <a:rPr lang="en-US" dirty="0" smtClean="0"/>
+              <a:t>Everyone stand up</a:t>
+            </a:r>
+          </a:p>
+          <a:p>
+            <a:pPr lvl="1"/>
+            <a:r>
+              <a:rPr lang="en-US" dirty="0" smtClean="0"/>
+              <a:t>Count everyone in the room</a:t>
+            </a:r>
+          </a:p>
+          <a:p>
+            <a:pPr lvl="1"/>
+            <a:r>
+              <a:rPr lang="en-US" dirty="0" smtClean="0"/>
+              <a:t>Sit down after you’re counted</a:t>
+            </a:r>
+          </a:p>
+        </p:txBody>
+      </p:sp>
+    </p:spTree>
+    <p:extLst>
+      <p:ext uri="{BB962C8B-B14F-4D97-AF65-F5344CB8AC3E}">
+        <p14:creationId xmlns:p14="http://schemas.microsoft.com/office/powerpoint/2010/main" val="989416240"/>
+      </p:ext>
+    </p:extLst>
+  </p:cSld>
+  <p:clrMapOvr>
+    <a:masterClrMapping/>
+  </p:clrMapOvr>
+  <p:transition>
+    <p:fade/>
+  </p:transition>
+</p:sld>
+</file>
+
+<file path=ppt/slides/slide16.xml><?xml version="1.0" encoding="utf-8"?>
+<p:sld xmlns:a="http://schemas.openxmlformats.org/drawingml/2006/main" xmlns:r="http://schemas.openxmlformats.org/officeDocument/2006/relationships" xmlns:p="http://schemas.openxmlformats.org/presentationml/2006/main">
+  <p:cSld>
+    <p:spTree>
+      <p:nvGrpSpPr>
+        <p:cNvPr id="1" name=""/>
+        <p:cNvGrpSpPr/>
+        <p:nvPr/>
+      </p:nvGrpSpPr>
+      <p:grpSpPr>
+        <a:xfrm>
+          <a:off x="0" y="0"/>
+          <a:ext cx="0" cy="0"/>
+          <a:chOff x="0" y="0"/>
+          <a:chExt cx="0" cy="0"/>
+        </a:xfrm>
+      </p:grpSpPr>
+      <p:sp>
+        <p:nvSpPr>
+          <p:cNvPr id="2" name="Title 1"/>
+          <p:cNvSpPr>
+            <a:spLocks noGrp="1"/>
+          </p:cNvSpPr>
+          <p:nvPr>
+            <p:ph type="title"/>
+          </p:nvPr>
+        </p:nvSpPr>
+        <p:spPr/>
+        <p:txBody>
+          <a:bodyPr/>
+          <a:lstStyle/>
+          <a:p>
+            <a:r>
+              <a:rPr lang="en-US" dirty="0" smtClean="0"/>
+              <a:t>Example of Functional Thinking</a:t>
+            </a:r>
+            <a:endParaRPr lang="en-US" dirty="0"/>
+          </a:p>
+        </p:txBody>
+      </p:sp>
+      <p:sp>
+        <p:nvSpPr>
+          <p:cNvPr id="3" name="Content Placeholder 2"/>
+          <p:cNvSpPr>
+            <a:spLocks noGrp="1"/>
+          </p:cNvSpPr>
+          <p:nvPr>
+            <p:ph idx="1"/>
+          </p:nvPr>
+        </p:nvSpPr>
+        <p:spPr>
+          <a:xfrm>
+            <a:off x="381000" y="1412875"/>
+            <a:ext cx="8382000" cy="2677656"/>
+          </a:xfrm>
+        </p:spPr>
+        <p:txBody>
+          <a:bodyPr/>
+          <a:lstStyle/>
+          <a:p>
+            <a:r>
+              <a:rPr lang="en-US" dirty="0" smtClean="0"/>
+              <a:t>Activity 2:</a:t>
+            </a:r>
+          </a:p>
+          <a:p>
+            <a:pPr lvl="1"/>
+            <a:r>
+              <a:rPr lang="en-US" dirty="0" smtClean="0"/>
+              <a:t>Everyone stand up</a:t>
+            </a:r>
+          </a:p>
+          <a:p>
+            <a:pPr lvl="1"/>
+            <a:r>
+              <a:rPr lang="en-US" dirty="0" smtClean="0"/>
+              <a:t>Find a neighbor</a:t>
+            </a:r>
+          </a:p>
+          <a:p>
+            <a:pPr lvl="2"/>
+            <a:r>
+              <a:rPr lang="en-US" dirty="0" smtClean="0"/>
+              <a:t>Share your current room count</a:t>
+            </a:r>
+          </a:p>
+          <a:p>
+            <a:pPr lvl="2"/>
+            <a:r>
+              <a:rPr lang="en-US" dirty="0" smtClean="0"/>
+              <a:t>One of you sit down</a:t>
+            </a:r>
+          </a:p>
+          <a:p>
+            <a:pPr lvl="1"/>
+            <a:r>
+              <a:rPr lang="en-US" dirty="0" smtClean="0"/>
+              <a:t>Repeat until one person remaining</a:t>
+            </a:r>
+          </a:p>
+        </p:txBody>
+      </p:sp>
+    </p:spTree>
+    <p:extLst>
+      <p:ext uri="{BB962C8B-B14F-4D97-AF65-F5344CB8AC3E}">
+        <p14:creationId xmlns:p14="http://schemas.microsoft.com/office/powerpoint/2010/main" val="1819758042"/>
+      </p:ext>
+    </p:extLst>
+  </p:cSld>
+  <p:clrMapOvr>
+    <a:masterClrMapping/>
+  </p:clrMapOvr>
+  <p:transition>
+    <p:fade/>
+  </p:transition>
+</p:sld>
+</file>
+
+<file path=ppt/slides/slide17.xml><?xml version="1.0" encoding="utf-8"?>
+<p:sld xmlns:a="http://schemas.openxmlformats.org/drawingml/2006/main" xmlns:r="http://schemas.openxmlformats.org/officeDocument/2006/relationships" xmlns:p="http://schemas.openxmlformats.org/presentationml/2006/main">
+  <p:cSld>
+    <p:spTree>
+      <p:nvGrpSpPr>
+        <p:cNvPr id="1" name=""/>
+        <p:cNvGrpSpPr/>
+        <p:nvPr/>
+      </p:nvGrpSpPr>
+      <p:grpSpPr>
+        <a:xfrm>
+          <a:off x="0" y="0"/>
+          <a:ext cx="0" cy="0"/>
+          <a:chOff x="0" y="0"/>
+          <a:chExt cx="0" cy="0"/>
+        </a:xfrm>
+      </p:grpSpPr>
+      <p:sp>
+        <p:nvSpPr>
+          <p:cNvPr id="2" name="Title 1"/>
+          <p:cNvSpPr>
+            <a:spLocks noGrp="1"/>
+          </p:cNvSpPr>
+          <p:nvPr>
+            <p:ph type="title"/>
+          </p:nvPr>
+        </p:nvSpPr>
+        <p:spPr/>
+        <p:txBody>
+          <a:bodyPr/>
+          <a:lstStyle/>
+          <a:p>
+            <a:r>
+              <a:rPr lang="en-US" dirty="0" smtClean="0"/>
+              <a:t>Example of Functional Thinking</a:t>
+            </a:r>
+            <a:endParaRPr lang="en-US" dirty="0"/>
+          </a:p>
+        </p:txBody>
+      </p:sp>
+      <p:sp>
+        <p:nvSpPr>
+          <p:cNvPr id="3" name="Content Placeholder 2"/>
+          <p:cNvSpPr>
+            <a:spLocks noGrp="1"/>
+          </p:cNvSpPr>
+          <p:nvPr>
+            <p:ph idx="1"/>
+          </p:nvPr>
+        </p:nvSpPr>
+        <p:spPr>
+          <a:xfrm>
+            <a:off x="381000" y="1412875"/>
+            <a:ext cx="8382000" cy="4185761"/>
+          </a:xfrm>
+        </p:spPr>
+        <p:txBody>
+          <a:bodyPr/>
+          <a:lstStyle/>
+          <a:p>
+            <a:r>
+              <a:rPr lang="en-US" dirty="0" smtClean="0"/>
+              <a:t>Activity 1 resembles a for or while loop</a:t>
+            </a:r>
+          </a:p>
+          <a:p>
+            <a:pPr lvl="1"/>
+            <a:r>
+              <a:rPr lang="en-US" dirty="0" smtClean="0"/>
+              <a:t>x = x + 1 type thought</a:t>
+            </a:r>
+          </a:p>
+          <a:p>
+            <a:pPr lvl="1"/>
+            <a:r>
+              <a:rPr lang="en-US" dirty="0" smtClean="0"/>
+              <a:t>Took a long time</a:t>
+            </a:r>
+          </a:p>
+          <a:p>
+            <a:pPr lvl="1"/>
+            <a:r>
+              <a:rPr lang="en-US" dirty="0" smtClean="0"/>
+              <a:t>n steps</a:t>
+            </a:r>
+          </a:p>
+          <a:p>
+            <a:r>
+              <a:rPr lang="en-US" dirty="0" smtClean="0"/>
+              <a:t>Activity 2 resembles concurrent recursive function</a:t>
+            </a:r>
+          </a:p>
+          <a:p>
+            <a:pPr lvl="1"/>
+            <a:r>
+              <a:rPr lang="en-US" dirty="0" err="1" smtClean="0"/>
+              <a:t>def</a:t>
+            </a:r>
+            <a:r>
+              <a:rPr lang="en-US" dirty="0" smtClean="0"/>
+              <a:t> </a:t>
+            </a:r>
+            <a:r>
+              <a:rPr lang="en-US" dirty="0" err="1" smtClean="0"/>
+              <a:t>countPerson</a:t>
+            </a:r>
+            <a:r>
+              <a:rPr lang="en-US" dirty="0" smtClean="0"/>
+              <a:t> (</a:t>
+            </a:r>
+            <a:r>
+              <a:rPr lang="en-US" dirty="0" err="1" smtClean="0"/>
+              <a:t>val</a:t>
+            </a:r>
+            <a:r>
+              <a:rPr lang="en-US" dirty="0" smtClean="0"/>
+              <a:t>):</a:t>
+            </a:r>
+            <a:br>
+              <a:rPr lang="en-US" dirty="0" smtClean="0"/>
+            </a:br>
+            <a:r>
+              <a:rPr lang="en-US" dirty="0" smtClean="0"/>
+              <a:t>     return </a:t>
+            </a:r>
+            <a:r>
+              <a:rPr lang="en-US" dirty="0" err="1" smtClean="0"/>
+              <a:t>val</a:t>
+            </a:r>
+            <a:r>
+              <a:rPr lang="en-US" dirty="0" smtClean="0"/>
+              <a:t> + 1</a:t>
+            </a:r>
+          </a:p>
+          <a:p>
+            <a:pPr lvl="1"/>
+            <a:r>
+              <a:rPr lang="en-US" dirty="0" smtClean="0"/>
+              <a:t>Multiple sets counted at the same time</a:t>
+            </a:r>
+          </a:p>
+        </p:txBody>
+      </p:sp>
+    </p:spTree>
+    <p:extLst>
+      <p:ext uri="{BB962C8B-B14F-4D97-AF65-F5344CB8AC3E}">
+        <p14:creationId xmlns:p14="http://schemas.microsoft.com/office/powerpoint/2010/main" val="2361074978"/>
+      </p:ext>
+    </p:extLst>
+  </p:cSld>
+  <p:clrMapOvr>
+    <a:masterClrMapping/>
+  </p:clrMapOvr>
+  <p:transition>
+    <p:fade/>
+  </p:transition>
+</p:sld>
+</file>
+
+<file path=ppt/slides/slide18.xml><?xml version="1.0" encoding="utf-8"?>
+<p:sld xmlns:a="http://schemas.openxmlformats.org/drawingml/2006/main" xmlns:r="http://schemas.openxmlformats.org/officeDocument/2006/relationships" xmlns:p="http://schemas.openxmlformats.org/presentationml/2006/main">
+  <p:cSld>
+    <p:spTree>
+      <p:nvGrpSpPr>
+        <p:cNvPr id="1" name=""/>
+        <p:cNvGrpSpPr/>
+        <p:nvPr/>
+      </p:nvGrpSpPr>
+      <p:grpSpPr>
+        <a:xfrm>
+          <a:off x="0" y="0"/>
+          <a:ext cx="0" cy="0"/>
+          <a:chOff x="0" y="0"/>
+          <a:chExt cx="0" cy="0"/>
+        </a:xfrm>
+      </p:grpSpPr>
+      <p:sp>
+        <p:nvSpPr>
+          <p:cNvPr id="2" name="Title 1"/>
+          <p:cNvSpPr>
+            <a:spLocks noGrp="1"/>
+          </p:cNvSpPr>
+          <p:nvPr>
+            <p:ph type="title"/>
+          </p:nvPr>
+        </p:nvSpPr>
+        <p:spPr/>
+        <p:txBody>
+          <a:bodyPr/>
+          <a:lstStyle/>
+          <a:p>
+            <a:r>
+              <a:rPr lang="en-US" dirty="0" smtClean="0"/>
+              <a:t>Example of Functional Thinking</a:t>
+            </a:r>
+            <a:endParaRPr lang="en-US" dirty="0"/>
+          </a:p>
+        </p:txBody>
+      </p:sp>
+      <p:sp>
+        <p:nvSpPr>
+          <p:cNvPr id="3" name="Content Placeholder 2"/>
+          <p:cNvSpPr>
+            <a:spLocks noGrp="1"/>
+          </p:cNvSpPr>
+          <p:nvPr>
+            <p:ph idx="1"/>
+          </p:nvPr>
+        </p:nvSpPr>
+        <p:spPr>
+          <a:xfrm>
+            <a:off x="381000" y="1412875"/>
+            <a:ext cx="8382000" cy="4659737"/>
+          </a:xfrm>
+        </p:spPr>
+        <p:txBody>
+          <a:bodyPr/>
+          <a:lstStyle/>
+          <a:p>
+            <a:r>
+              <a:rPr lang="en-US" dirty="0" smtClean="0"/>
+              <a:t>Activity 1 resembles a for or while loop</a:t>
+            </a:r>
+          </a:p>
+          <a:p>
+            <a:pPr lvl="1"/>
+            <a:r>
+              <a:rPr lang="en-US" dirty="0" smtClean="0"/>
+              <a:t>x = x + 1 type thought</a:t>
+            </a:r>
+          </a:p>
+          <a:p>
+            <a:pPr lvl="1"/>
+            <a:r>
+              <a:rPr lang="en-US" dirty="0" smtClean="0"/>
+              <a:t>Took a long time</a:t>
+            </a:r>
+          </a:p>
+          <a:p>
+            <a:pPr lvl="1"/>
+            <a:r>
+              <a:rPr lang="en-US" dirty="0" smtClean="0"/>
+              <a:t>n steps</a:t>
+            </a:r>
+          </a:p>
+          <a:p>
+            <a:r>
+              <a:rPr lang="en-US" dirty="0" smtClean="0"/>
+              <a:t>Activity 2 resembles concurrent recursive function</a:t>
+            </a:r>
+          </a:p>
+          <a:p>
+            <a:pPr lvl="1"/>
+            <a:r>
+              <a:rPr lang="en-US" dirty="0" err="1" smtClean="0"/>
+              <a:t>def</a:t>
+            </a:r>
+            <a:r>
+              <a:rPr lang="en-US" dirty="0" smtClean="0"/>
+              <a:t> </a:t>
+            </a:r>
+            <a:r>
+              <a:rPr lang="en-US" dirty="0" err="1" smtClean="0"/>
+              <a:t>countPerson</a:t>
+            </a:r>
+            <a:r>
+              <a:rPr lang="en-US" dirty="0" smtClean="0"/>
+              <a:t> (</a:t>
+            </a:r>
+            <a:r>
+              <a:rPr lang="en-US" dirty="0" err="1" smtClean="0"/>
+              <a:t>val</a:t>
+            </a:r>
+            <a:r>
+              <a:rPr lang="en-US" dirty="0" smtClean="0"/>
+              <a:t>):</a:t>
+            </a:r>
+            <a:br>
+              <a:rPr lang="en-US" dirty="0" smtClean="0"/>
+            </a:br>
+            <a:r>
+              <a:rPr lang="en-US" dirty="0" smtClean="0"/>
+              <a:t>     return </a:t>
+            </a:r>
+            <a:r>
+              <a:rPr lang="en-US" dirty="0" err="1" smtClean="0"/>
+              <a:t>val</a:t>
+            </a:r>
+            <a:r>
+              <a:rPr lang="en-US" dirty="0" smtClean="0"/>
+              <a:t> + 1</a:t>
+            </a:r>
+          </a:p>
+          <a:p>
+            <a:pPr lvl="1"/>
+            <a:r>
+              <a:rPr lang="en-US" dirty="0" smtClean="0"/>
+              <a:t>Multiple sets counted at the same time</a:t>
+            </a:r>
+          </a:p>
+          <a:p>
+            <a:pPr lvl="1"/>
+            <a:r>
+              <a:rPr lang="en-US" dirty="0" smtClean="0"/>
+              <a:t>log</a:t>
+            </a:r>
+            <a:r>
+              <a:rPr lang="en-US" baseline="-25000" dirty="0" smtClean="0"/>
+              <a:t>2</a:t>
+            </a:r>
+            <a:r>
+              <a:rPr lang="en-US" dirty="0" smtClean="0"/>
+              <a:t> n steps</a:t>
+            </a:r>
+            <a:endParaRPr lang="en-US" baseline="-25000" dirty="0" smtClean="0"/>
+          </a:p>
+        </p:txBody>
+      </p:sp>
+    </p:spTree>
+    <p:extLst>
+      <p:ext uri="{BB962C8B-B14F-4D97-AF65-F5344CB8AC3E}">
+        <p14:creationId xmlns:p14="http://schemas.microsoft.com/office/powerpoint/2010/main" val="3355678832"/>
+      </p:ext>
+    </p:extLst>
+  </p:cSld>
+  <p:clrMapOvr>
+    <a:masterClrMapping/>
+  </p:clrMapOvr>
+  <p:transition>
+    <p:fade/>
+  </p:transition>
+</p:sld>
+</file>
+
+<file path=ppt/slides/slide19.xml><?xml version="1.0" encoding="utf-8"?>
+<p:sld xmlns:a="http://schemas.openxmlformats.org/drawingml/2006/main" xmlns:r="http://schemas.openxmlformats.org/officeDocument/2006/relationships" xmlns:p="http://schemas.openxmlformats.org/presentationml/2006/main">
+  <p:cSld>
+    <p:spTree>
+      <p:nvGrpSpPr>
+        <p:cNvPr id="1" name=""/>
+        <p:cNvGrpSpPr/>
+        <p:nvPr/>
+      </p:nvGrpSpPr>
+      <p:grpSpPr>
+        <a:xfrm>
+          <a:off x="0" y="0"/>
+          <a:ext cx="0" cy="0"/>
+          <a:chOff x="0" y="0"/>
+          <a:chExt cx="0" cy="0"/>
+        </a:xfrm>
+      </p:grpSpPr>
+      <p:sp>
+        <p:nvSpPr>
+          <p:cNvPr id="2" name="Title 1"/>
+          <p:cNvSpPr>
+            <a:spLocks noGrp="1"/>
+          </p:cNvSpPr>
+          <p:nvPr>
+            <p:ph type="title"/>
+          </p:nvPr>
+        </p:nvSpPr>
+        <p:spPr/>
+        <p:txBody>
+          <a:bodyPr/>
+          <a:lstStyle/>
+          <a:p>
+            <a:r>
+              <a:rPr lang="en-US" dirty="0" smtClean="0"/>
+              <a:t>List of Functional Languages (Pure)</a:t>
+            </a:r>
+            <a:endParaRPr lang="en-US" dirty="0"/>
+          </a:p>
+        </p:txBody>
+      </p:sp>
+      <p:sp>
+        <p:nvSpPr>
+          <p:cNvPr id="3" name="Content Placeholder 2"/>
+          <p:cNvSpPr>
+            <a:spLocks noGrp="1"/>
+          </p:cNvSpPr>
+          <p:nvPr>
+            <p:ph idx="1"/>
+          </p:nvPr>
+        </p:nvSpPr>
+        <p:spPr>
+          <a:xfrm>
+            <a:off x="381000" y="1412875"/>
+            <a:ext cx="8382000" cy="4378325"/>
+          </a:xfrm>
+        </p:spPr>
+        <p:txBody>
+          <a:bodyPr numCol="2"/>
+          <a:lstStyle/>
+          <a:p>
+            <a:r>
+              <a:rPr lang="en-US" dirty="0" err="1" smtClean="0"/>
+              <a:t>Agda</a:t>
+            </a:r>
+            <a:endParaRPr lang="en-US" dirty="0" smtClean="0"/>
+          </a:p>
+          <a:p>
+            <a:r>
+              <a:rPr lang="en-US" dirty="0" smtClean="0"/>
+              <a:t>Charity</a:t>
+            </a:r>
+          </a:p>
+          <a:p>
+            <a:r>
+              <a:rPr lang="en-US" dirty="0" smtClean="0"/>
+              <a:t>Clean</a:t>
+            </a:r>
+          </a:p>
+          <a:p>
+            <a:r>
+              <a:rPr lang="en-US" dirty="0" smtClean="0"/>
+              <a:t>Coq</a:t>
+            </a:r>
+          </a:p>
+          <a:p>
+            <a:r>
+              <a:rPr lang="en-US" dirty="0" smtClean="0"/>
+              <a:t>Curry</a:t>
+            </a:r>
+          </a:p>
+          <a:p>
+            <a:r>
+              <a:rPr lang="en-US" dirty="0" smtClean="0"/>
+              <a:t>Elm</a:t>
+            </a:r>
+          </a:p>
+          <a:p>
+            <a:r>
+              <a:rPr lang="en-US" dirty="0" err="1" smtClean="0"/>
+              <a:t>Frege</a:t>
+            </a:r>
+            <a:endParaRPr lang="en-US" dirty="0" smtClean="0"/>
+          </a:p>
+          <a:p>
+            <a:r>
+              <a:rPr lang="en-US" dirty="0" smtClean="0"/>
+              <a:t>Haskell</a:t>
+            </a:r>
+          </a:p>
+          <a:p>
+            <a:r>
+              <a:rPr lang="en-US" dirty="0" smtClean="0"/>
+              <a:t>Hope</a:t>
+            </a:r>
+          </a:p>
+          <a:p>
+            <a:r>
+              <a:rPr lang="en-US" dirty="0" smtClean="0"/>
+              <a:t>Joy</a:t>
+            </a:r>
+          </a:p>
+          <a:p>
+            <a:r>
+              <a:rPr lang="en-US" dirty="0" smtClean="0"/>
+              <a:t>Mercury</a:t>
+            </a:r>
+          </a:p>
+          <a:p>
+            <a:r>
+              <a:rPr lang="en-US" dirty="0" smtClean="0"/>
+              <a:t>Miranda</a:t>
+            </a:r>
+          </a:p>
+          <a:p>
+            <a:r>
+              <a:rPr lang="en-US" dirty="0" smtClean="0"/>
+              <a:t>Idris</a:t>
+            </a:r>
+          </a:p>
+          <a:p>
+            <a:r>
+              <a:rPr lang="en-US" dirty="0" err="1" smtClean="0"/>
+              <a:t>SequenceL</a:t>
+            </a:r>
+            <a:endParaRPr lang="en-US" dirty="0"/>
+          </a:p>
+        </p:txBody>
+      </p:sp>
+    </p:spTree>
+    <p:extLst>
+      <p:ext uri="{BB962C8B-B14F-4D97-AF65-F5344CB8AC3E}">
+        <p14:creationId xmlns:p14="http://schemas.microsoft.com/office/powerpoint/2010/main" val="2277342255"/>
+      </p:ext>
+    </p:extLst>
+  </p:cSld>
+  <p:clrMapOvr>
+    <a:masterClrMapping/>
+  </p:clrMapOvr>
+  <p:transition>
+    <p:fade/>
+  </p:transition>
+</p:sld>
+</file>
+
 <file path=ppt/slides/slide2.xml><?xml version="1.0" encoding="utf-8"?>
 <p:sld xmlns:a="http://schemas.openxmlformats.org/drawingml/2006/main" xmlns:r="http://schemas.openxmlformats.org/officeDocument/2006/relationships" xmlns:p="http://schemas.openxmlformats.org/presentationml/2006/main">
   <p:cSld>
@@ -4527,6 +5872,1303 @@
     <p:extLst>
       <p:ext uri="{BB962C8B-B14F-4D97-AF65-F5344CB8AC3E}">
         <p14:creationId xmlns:p14="http://schemas.microsoft.com/office/powerpoint/2010/main" val="3164039493"/>
+      </p:ext>
+    </p:extLst>
+  </p:cSld>
+  <p:clrMapOvr>
+    <a:masterClrMapping/>
+  </p:clrMapOvr>
+  <p:transition>
+    <p:fade/>
+  </p:transition>
+</p:sld>
+</file>
+
+<file path=ppt/slides/slide20.xml><?xml version="1.0" encoding="utf-8"?>
+<p:sld xmlns:a="http://schemas.openxmlformats.org/drawingml/2006/main" xmlns:r="http://schemas.openxmlformats.org/officeDocument/2006/relationships" xmlns:p="http://schemas.openxmlformats.org/presentationml/2006/main">
+  <p:cSld>
+    <p:spTree>
+      <p:nvGrpSpPr>
+        <p:cNvPr id="1" name=""/>
+        <p:cNvGrpSpPr/>
+        <p:nvPr/>
+      </p:nvGrpSpPr>
+      <p:grpSpPr>
+        <a:xfrm>
+          <a:off x="0" y="0"/>
+          <a:ext cx="0" cy="0"/>
+          <a:chOff x="0" y="0"/>
+          <a:chExt cx="0" cy="0"/>
+        </a:xfrm>
+      </p:grpSpPr>
+      <p:sp>
+        <p:nvSpPr>
+          <p:cNvPr id="2" name="Title 1"/>
+          <p:cNvSpPr>
+            <a:spLocks noGrp="1"/>
+          </p:cNvSpPr>
+          <p:nvPr>
+            <p:ph type="title"/>
+          </p:nvPr>
+        </p:nvSpPr>
+        <p:spPr>
+          <a:xfrm>
+            <a:off x="381000" y="230188"/>
+            <a:ext cx="8382000" cy="637097"/>
+          </a:xfrm>
+        </p:spPr>
+        <p:txBody>
+          <a:bodyPr/>
+          <a:lstStyle/>
+          <a:p>
+            <a:r>
+              <a:rPr lang="en-US" sz="4600" dirty="0" smtClean="0"/>
+              <a:t>List of Functional Languages (Impure)</a:t>
+            </a:r>
+            <a:endParaRPr lang="en-US" sz="4600" dirty="0"/>
+          </a:p>
+        </p:txBody>
+      </p:sp>
+      <p:sp>
+        <p:nvSpPr>
+          <p:cNvPr id="3" name="Content Placeholder 2"/>
+          <p:cNvSpPr>
+            <a:spLocks noGrp="1"/>
+          </p:cNvSpPr>
+          <p:nvPr>
+            <p:ph idx="1"/>
+          </p:nvPr>
+        </p:nvSpPr>
+        <p:spPr>
+          <a:xfrm>
+            <a:off x="381000" y="1412875"/>
+            <a:ext cx="8382000" cy="4454525"/>
+          </a:xfrm>
+        </p:spPr>
+        <p:txBody>
+          <a:bodyPr numCol="3"/>
+          <a:lstStyle/>
+          <a:p>
+            <a:r>
+              <a:rPr lang="en-US" sz="1400" dirty="0" smtClean="0"/>
+              <a:t>APL</a:t>
+            </a:r>
+          </a:p>
+          <a:p>
+            <a:r>
+              <a:rPr lang="en-US" sz="1400" dirty="0" smtClean="0"/>
+              <a:t>ATS</a:t>
+            </a:r>
+          </a:p>
+          <a:p>
+            <a:r>
+              <a:rPr lang="en-US" sz="1400" dirty="0" smtClean="0"/>
+              <a:t>CAL</a:t>
+            </a:r>
+          </a:p>
+          <a:p>
+            <a:r>
+              <a:rPr lang="en-US" sz="1400" dirty="0" smtClean="0"/>
+              <a:t>C++ (since C++11)</a:t>
+            </a:r>
+          </a:p>
+          <a:p>
+            <a:r>
+              <a:rPr lang="en-US" sz="1400" dirty="0" smtClean="0"/>
+              <a:t>C#</a:t>
+            </a:r>
+          </a:p>
+          <a:p>
+            <a:r>
+              <a:rPr lang="en-US" sz="1400" dirty="0" smtClean="0"/>
+              <a:t>Ceylon</a:t>
+            </a:r>
+          </a:p>
+          <a:p>
+            <a:r>
+              <a:rPr lang="en-US" sz="1400" dirty="0" smtClean="0"/>
+              <a:t>D</a:t>
+            </a:r>
+          </a:p>
+          <a:p>
+            <a:r>
+              <a:rPr lang="en-US" sz="1400" dirty="0" smtClean="0"/>
+              <a:t>Dart</a:t>
+            </a:r>
+          </a:p>
+          <a:p>
+            <a:r>
+              <a:rPr lang="en-US" sz="1400" dirty="0" smtClean="0"/>
+              <a:t>ECMAScript</a:t>
+            </a:r>
+          </a:p>
+          <a:p>
+            <a:pPr lvl="1"/>
+            <a:r>
+              <a:rPr lang="en-US" sz="1400" dirty="0" smtClean="0"/>
+              <a:t>ActionScript</a:t>
+            </a:r>
+          </a:p>
+          <a:p>
+            <a:pPr lvl="1"/>
+            <a:r>
+              <a:rPr lang="en-US" sz="1400" dirty="0" smtClean="0"/>
+              <a:t>ECMAScript for XML</a:t>
+            </a:r>
+          </a:p>
+          <a:p>
+            <a:pPr lvl="1"/>
+            <a:r>
+              <a:rPr lang="en-US" sz="1400" dirty="0" smtClean="0"/>
+              <a:t>JavaScript</a:t>
+            </a:r>
+          </a:p>
+          <a:p>
+            <a:pPr lvl="1"/>
+            <a:r>
+              <a:rPr lang="en-US" sz="1400" dirty="0" smtClean="0"/>
+              <a:t>Jscript</a:t>
+            </a:r>
+          </a:p>
+          <a:p>
+            <a:r>
+              <a:rPr lang="en-US" sz="1400" dirty="0" err="1" smtClean="0"/>
+              <a:t>Erlang</a:t>
+            </a:r>
+            <a:endParaRPr lang="en-US" sz="1400" dirty="0" smtClean="0"/>
+          </a:p>
+          <a:p>
+            <a:pPr lvl="1"/>
+            <a:r>
+              <a:rPr lang="en-US" sz="1400" dirty="0" smtClean="0"/>
+              <a:t>Elixir</a:t>
+            </a:r>
+          </a:p>
+          <a:p>
+            <a:pPr lvl="1"/>
+            <a:r>
+              <a:rPr lang="en-US" sz="1400" dirty="0" smtClean="0"/>
+              <a:t>LFE</a:t>
+            </a:r>
+          </a:p>
+          <a:p>
+            <a:r>
+              <a:rPr lang="en-US" sz="1400" dirty="0" smtClean="0"/>
+              <a:t>F#</a:t>
+            </a:r>
+          </a:p>
+          <a:p>
+            <a:r>
+              <a:rPr lang="en-US" sz="1400" dirty="0" err="1" smtClean="0"/>
+              <a:t>FPr</a:t>
+            </a:r>
+            <a:endParaRPr lang="en-US" sz="1400" dirty="0" smtClean="0"/>
+          </a:p>
+          <a:p>
+            <a:r>
+              <a:rPr lang="en-US" sz="1400" dirty="0" smtClean="0"/>
+              <a:t>Groovy</a:t>
+            </a:r>
+          </a:p>
+          <a:p>
+            <a:r>
+              <a:rPr lang="en-US" sz="1400" dirty="0" smtClean="0"/>
+              <a:t>Hop</a:t>
+            </a:r>
+          </a:p>
+          <a:p>
+            <a:r>
+              <a:rPr lang="en-US" sz="1400" dirty="0" smtClean="0"/>
+              <a:t>J</a:t>
+            </a:r>
+          </a:p>
+          <a:p>
+            <a:r>
+              <a:rPr lang="en-US" sz="1400" dirty="0" smtClean="0"/>
+              <a:t>Java (since Java 8)</a:t>
+            </a:r>
+          </a:p>
+          <a:p>
+            <a:r>
+              <a:rPr lang="en-US" sz="1400" dirty="0" smtClean="0"/>
+              <a:t>Julia</a:t>
+            </a:r>
+          </a:p>
+          <a:p>
+            <a:r>
+              <a:rPr lang="en-US" sz="1400" dirty="0" smtClean="0"/>
+              <a:t>Lisp</a:t>
+            </a:r>
+          </a:p>
+          <a:p>
+            <a:pPr lvl="1"/>
+            <a:r>
+              <a:rPr lang="en-US" sz="1400" dirty="0" err="1" smtClean="0"/>
+              <a:t>Clojure</a:t>
+            </a:r>
+            <a:endParaRPr lang="en-US" sz="1400" dirty="0" smtClean="0"/>
+          </a:p>
+          <a:p>
+            <a:pPr lvl="1"/>
+            <a:r>
+              <a:rPr lang="en-US" sz="1400" dirty="0" smtClean="0"/>
+              <a:t>Common Lisp</a:t>
+            </a:r>
+          </a:p>
+          <a:p>
+            <a:pPr lvl="1"/>
+            <a:r>
+              <a:rPr lang="en-US" sz="1400" dirty="0" smtClean="0"/>
+              <a:t>Dylan</a:t>
+            </a:r>
+          </a:p>
+          <a:p>
+            <a:pPr lvl="1"/>
+            <a:r>
+              <a:rPr lang="en-US" sz="1400" dirty="0" err="1" smtClean="0"/>
+              <a:t>Emacs</a:t>
+            </a:r>
+            <a:r>
+              <a:rPr lang="en-US" sz="1400" dirty="0" smtClean="0"/>
+              <a:t> Lisp</a:t>
+            </a:r>
+          </a:p>
+          <a:p>
+            <a:pPr lvl="1"/>
+            <a:r>
+              <a:rPr lang="en-US" sz="1400" dirty="0" smtClean="0"/>
+              <a:t>LFE</a:t>
+            </a:r>
+          </a:p>
+          <a:p>
+            <a:pPr lvl="1"/>
+            <a:r>
+              <a:rPr lang="en-US" sz="1400" dirty="0" smtClean="0"/>
+              <a:t>Little b</a:t>
+            </a:r>
+          </a:p>
+          <a:p>
+            <a:pPr lvl="1"/>
+            <a:r>
+              <a:rPr lang="en-US" sz="1400" dirty="0" smtClean="0"/>
+              <a:t>Logo</a:t>
+            </a:r>
+          </a:p>
+          <a:p>
+            <a:pPr lvl="1"/>
+            <a:r>
+              <a:rPr lang="en-US" sz="1400" dirty="0" smtClean="0"/>
+              <a:t>Scheme</a:t>
+            </a:r>
+          </a:p>
+          <a:p>
+            <a:pPr lvl="2"/>
+            <a:r>
+              <a:rPr lang="en-US" sz="1400" dirty="0" smtClean="0"/>
+              <a:t>Racket</a:t>
+            </a:r>
+          </a:p>
+          <a:p>
+            <a:r>
+              <a:rPr lang="en-US" sz="1400" dirty="0" smtClean="0"/>
+              <a:t>Mathematica</a:t>
+            </a:r>
+          </a:p>
+          <a:p>
+            <a:r>
+              <a:rPr lang="en-US" sz="1400" dirty="0" smtClean="0"/>
+              <a:t>ML</a:t>
+            </a:r>
+          </a:p>
+          <a:p>
+            <a:pPr lvl="1"/>
+            <a:r>
+              <a:rPr lang="en-US" sz="1400" dirty="0" smtClean="0"/>
+              <a:t>Standard ML</a:t>
+            </a:r>
+          </a:p>
+          <a:p>
+            <a:pPr lvl="2"/>
+            <a:r>
+              <a:rPr lang="en-US" sz="1400" dirty="0" smtClean="0"/>
+              <a:t>Alice</a:t>
+            </a:r>
+            <a:endParaRPr lang="en-US" sz="1400" dirty="0"/>
+          </a:p>
+          <a:p>
+            <a:pPr lvl="1"/>
+            <a:r>
+              <a:rPr lang="en-US" sz="1400" dirty="0" err="1" smtClean="0"/>
+              <a:t>Ocaml</a:t>
+            </a:r>
+            <a:endParaRPr lang="en-US" sz="1400" dirty="0" smtClean="0"/>
+          </a:p>
+          <a:p>
+            <a:r>
+              <a:rPr lang="en-US" sz="1400" dirty="0" err="1" smtClean="0"/>
+              <a:t>Nemerle</a:t>
+            </a:r>
+            <a:endParaRPr lang="en-US" sz="1400" dirty="0" smtClean="0"/>
+          </a:p>
+          <a:p>
+            <a:r>
+              <a:rPr lang="en-US" sz="1400" dirty="0" smtClean="0"/>
+              <a:t>Opal</a:t>
+            </a:r>
+          </a:p>
+          <a:p>
+            <a:r>
+              <a:rPr lang="en-US" sz="1400" dirty="0" smtClean="0"/>
+              <a:t>OPS5</a:t>
+            </a:r>
+          </a:p>
+          <a:p>
+            <a:r>
+              <a:rPr lang="en-US" sz="1400" dirty="0" err="1" smtClean="0"/>
+              <a:t>Poplog</a:t>
+            </a:r>
+            <a:endParaRPr lang="en-US" sz="1400" dirty="0" smtClean="0"/>
+          </a:p>
+          <a:p>
+            <a:r>
+              <a:rPr lang="en-US" sz="1400" dirty="0" smtClean="0"/>
+              <a:t>Python</a:t>
+            </a:r>
+          </a:p>
+          <a:p>
+            <a:r>
+              <a:rPr lang="en-US" sz="1400" dirty="0" smtClean="0"/>
+              <a:t>Q</a:t>
+            </a:r>
+          </a:p>
+          <a:p>
+            <a:r>
+              <a:rPr lang="en-US" sz="1400" dirty="0" smtClean="0"/>
+              <a:t>R</a:t>
+            </a:r>
+          </a:p>
+          <a:p>
+            <a:r>
+              <a:rPr lang="en-US" sz="1400" dirty="0" smtClean="0"/>
+              <a:t>Ruby</a:t>
+            </a:r>
+          </a:p>
+          <a:p>
+            <a:r>
+              <a:rPr lang="en-US" sz="1400" dirty="0" smtClean="0"/>
+              <a:t>REFAL</a:t>
+            </a:r>
+          </a:p>
+          <a:p>
+            <a:r>
+              <a:rPr lang="en-US" sz="1400" dirty="0" smtClean="0"/>
+              <a:t>Rust</a:t>
+            </a:r>
+          </a:p>
+          <a:p>
+            <a:r>
+              <a:rPr lang="en-US" sz="1400" dirty="0" smtClean="0"/>
+              <a:t>Scala</a:t>
+            </a:r>
+          </a:p>
+          <a:p>
+            <a:r>
+              <a:rPr lang="en-US" sz="1400" dirty="0" smtClean="0"/>
+              <a:t>Spreadsheets</a:t>
+            </a:r>
+          </a:p>
+        </p:txBody>
+      </p:sp>
+    </p:spTree>
+    <p:extLst>
+      <p:ext uri="{BB962C8B-B14F-4D97-AF65-F5344CB8AC3E}">
+        <p14:creationId xmlns:p14="http://schemas.microsoft.com/office/powerpoint/2010/main" val="645701959"/>
+      </p:ext>
+    </p:extLst>
+  </p:cSld>
+  <p:clrMapOvr>
+    <a:masterClrMapping/>
+  </p:clrMapOvr>
+  <p:transition>
+    <p:fade/>
+  </p:transition>
+</p:sld>
+</file>
+
+<file path=ppt/slides/slide21.xml><?xml version="1.0" encoding="utf-8"?>
+<p:sld xmlns:a="http://schemas.openxmlformats.org/drawingml/2006/main" xmlns:r="http://schemas.openxmlformats.org/officeDocument/2006/relationships" xmlns:p="http://schemas.openxmlformats.org/presentationml/2006/main">
+  <p:cSld>
+    <p:spTree>
+      <p:nvGrpSpPr>
+        <p:cNvPr id="1" name=""/>
+        <p:cNvGrpSpPr/>
+        <p:nvPr/>
+      </p:nvGrpSpPr>
+      <p:grpSpPr>
+        <a:xfrm>
+          <a:off x="0" y="0"/>
+          <a:ext cx="0" cy="0"/>
+          <a:chOff x="0" y="0"/>
+          <a:chExt cx="0" cy="0"/>
+        </a:xfrm>
+      </p:grpSpPr>
+      <p:sp>
+        <p:nvSpPr>
+          <p:cNvPr id="2" name="Title 1"/>
+          <p:cNvSpPr>
+            <a:spLocks noGrp="1"/>
+          </p:cNvSpPr>
+          <p:nvPr>
+            <p:ph type="title"/>
+          </p:nvPr>
+        </p:nvSpPr>
+        <p:spPr/>
+        <p:txBody>
+          <a:bodyPr/>
+          <a:lstStyle/>
+          <a:p>
+            <a:r>
+              <a:rPr lang="en-US" dirty="0" smtClean="0"/>
+              <a:t>Languages - Elm</a:t>
+            </a:r>
+            <a:endParaRPr lang="en-US" dirty="0"/>
+          </a:p>
+        </p:txBody>
+      </p:sp>
+      <p:sp>
+        <p:nvSpPr>
+          <p:cNvPr id="3" name="Content Placeholder 2"/>
+          <p:cNvSpPr>
+            <a:spLocks noGrp="1"/>
+          </p:cNvSpPr>
+          <p:nvPr>
+            <p:ph idx="1"/>
+          </p:nvPr>
+        </p:nvSpPr>
+        <p:spPr>
+          <a:xfrm>
+            <a:off x="381000" y="1412875"/>
+            <a:ext cx="8382000" cy="4481227"/>
+          </a:xfrm>
+        </p:spPr>
+        <p:txBody>
+          <a:bodyPr/>
+          <a:lstStyle/>
+          <a:p>
+            <a:r>
+              <a:rPr lang="en-US" dirty="0" smtClean="0"/>
+              <a:t>Pure functional language</a:t>
+            </a:r>
+          </a:p>
+          <a:p>
+            <a:r>
+              <a:rPr lang="en-US" dirty="0" smtClean="0"/>
+              <a:t>Statically typed (primitive types, lists, tuples, records, unions)</a:t>
+            </a:r>
+          </a:p>
+          <a:p>
+            <a:r>
+              <a:rPr lang="en-US" dirty="0" smtClean="0"/>
+              <a:t>Immutable types (keeps data pure by making you create new variables)</a:t>
+            </a:r>
+          </a:p>
+          <a:p>
+            <a:r>
+              <a:rPr lang="en-US" dirty="0" smtClean="0"/>
+              <a:t>No runtime exceptions (compiler finds them first)</a:t>
+            </a:r>
+          </a:p>
+          <a:p>
+            <a:r>
+              <a:rPr lang="en-US" dirty="0" smtClean="0"/>
+              <a:t>Super friendly error messages</a:t>
+            </a:r>
+          </a:p>
+          <a:p>
+            <a:r>
+              <a:rPr lang="en-US" dirty="0" smtClean="0"/>
+              <a:t>Compiles to JavaScript for the browser</a:t>
+            </a:r>
+            <a:endParaRPr lang="en-US" dirty="0"/>
+          </a:p>
+        </p:txBody>
+      </p:sp>
+    </p:spTree>
+    <p:extLst>
+      <p:ext uri="{BB962C8B-B14F-4D97-AF65-F5344CB8AC3E}">
+        <p14:creationId xmlns:p14="http://schemas.microsoft.com/office/powerpoint/2010/main" val="29335009"/>
+      </p:ext>
+    </p:extLst>
+  </p:cSld>
+  <p:clrMapOvr>
+    <a:masterClrMapping/>
+  </p:clrMapOvr>
+  <p:transition>
+    <p:fade/>
+  </p:transition>
+</p:sld>
+</file>
+
+<file path=ppt/slides/slide22.xml><?xml version="1.0" encoding="utf-8"?>
+<p:sld xmlns:a="http://schemas.openxmlformats.org/drawingml/2006/main" xmlns:r="http://schemas.openxmlformats.org/officeDocument/2006/relationships" xmlns:p="http://schemas.openxmlformats.org/presentationml/2006/main">
+  <p:cSld>
+    <p:spTree>
+      <p:nvGrpSpPr>
+        <p:cNvPr id="1" name=""/>
+        <p:cNvGrpSpPr/>
+        <p:nvPr/>
+      </p:nvGrpSpPr>
+      <p:grpSpPr>
+        <a:xfrm>
+          <a:off x="0" y="0"/>
+          <a:ext cx="0" cy="0"/>
+          <a:chOff x="0" y="0"/>
+          <a:chExt cx="0" cy="0"/>
+        </a:xfrm>
+      </p:grpSpPr>
+      <p:sp>
+        <p:nvSpPr>
+          <p:cNvPr id="2" name="Title 1"/>
+          <p:cNvSpPr>
+            <a:spLocks noGrp="1"/>
+          </p:cNvSpPr>
+          <p:nvPr>
+            <p:ph type="title"/>
+          </p:nvPr>
+        </p:nvSpPr>
+        <p:spPr/>
+        <p:txBody>
+          <a:bodyPr/>
+          <a:lstStyle/>
+          <a:p>
+            <a:r>
+              <a:rPr lang="en-US" dirty="0" smtClean="0"/>
+              <a:t>Languages - Haskell</a:t>
+            </a:r>
+            <a:endParaRPr lang="en-US" dirty="0"/>
+          </a:p>
+        </p:txBody>
+      </p:sp>
+      <p:sp>
+        <p:nvSpPr>
+          <p:cNvPr id="3" name="Content Placeholder 2"/>
+          <p:cNvSpPr>
+            <a:spLocks noGrp="1"/>
+          </p:cNvSpPr>
+          <p:nvPr>
+            <p:ph idx="1"/>
+          </p:nvPr>
+        </p:nvSpPr>
+        <p:spPr>
+          <a:xfrm>
+            <a:off x="381000" y="1412875"/>
+            <a:ext cx="8382000" cy="2068259"/>
+          </a:xfrm>
+        </p:spPr>
+        <p:txBody>
+          <a:bodyPr/>
+          <a:lstStyle/>
+          <a:p>
+            <a:r>
+              <a:rPr lang="en-US" dirty="0" smtClean="0"/>
+              <a:t>Pure functional language</a:t>
+            </a:r>
+          </a:p>
+          <a:p>
+            <a:r>
+              <a:rPr lang="en-US" dirty="0" smtClean="0"/>
+              <a:t>Statically typed, type inference</a:t>
+            </a:r>
+          </a:p>
+          <a:p>
+            <a:r>
+              <a:rPr lang="en-US" dirty="0" smtClean="0"/>
+              <a:t>Lazy evaluation and pattern matching</a:t>
+            </a:r>
+          </a:p>
+          <a:p>
+            <a:endParaRPr lang="en-US" dirty="0" smtClean="0"/>
+          </a:p>
+        </p:txBody>
+      </p:sp>
+    </p:spTree>
+    <p:extLst>
+      <p:ext uri="{BB962C8B-B14F-4D97-AF65-F5344CB8AC3E}">
+        <p14:creationId xmlns:p14="http://schemas.microsoft.com/office/powerpoint/2010/main" val="2992256337"/>
+      </p:ext>
+    </p:extLst>
+  </p:cSld>
+  <p:clrMapOvr>
+    <a:masterClrMapping/>
+  </p:clrMapOvr>
+  <p:transition>
+    <p:fade/>
+  </p:transition>
+</p:sld>
+</file>
+
+<file path=ppt/slides/slide23.xml><?xml version="1.0" encoding="utf-8"?>
+<p:sld xmlns:a="http://schemas.openxmlformats.org/drawingml/2006/main" xmlns:r="http://schemas.openxmlformats.org/officeDocument/2006/relationships" xmlns:p="http://schemas.openxmlformats.org/presentationml/2006/main">
+  <p:cSld>
+    <p:spTree>
+      <p:nvGrpSpPr>
+        <p:cNvPr id="1" name=""/>
+        <p:cNvGrpSpPr/>
+        <p:nvPr/>
+      </p:nvGrpSpPr>
+      <p:grpSpPr>
+        <a:xfrm>
+          <a:off x="0" y="0"/>
+          <a:ext cx="0" cy="0"/>
+          <a:chOff x="0" y="0"/>
+          <a:chExt cx="0" cy="0"/>
+        </a:xfrm>
+      </p:grpSpPr>
+      <p:sp>
+        <p:nvSpPr>
+          <p:cNvPr id="2" name="Title 1"/>
+          <p:cNvSpPr>
+            <a:spLocks noGrp="1"/>
+          </p:cNvSpPr>
+          <p:nvPr>
+            <p:ph type="title"/>
+          </p:nvPr>
+        </p:nvSpPr>
+        <p:spPr/>
+        <p:txBody>
+          <a:bodyPr/>
+          <a:lstStyle/>
+          <a:p>
+            <a:r>
+              <a:rPr lang="en-US" dirty="0" smtClean="0"/>
+              <a:t>Languages - LISP</a:t>
+            </a:r>
+            <a:endParaRPr lang="en-US" dirty="0"/>
+          </a:p>
+        </p:txBody>
+      </p:sp>
+      <p:sp>
+        <p:nvSpPr>
+          <p:cNvPr id="3" name="Content Placeholder 2"/>
+          <p:cNvSpPr>
+            <a:spLocks noGrp="1"/>
+          </p:cNvSpPr>
+          <p:nvPr>
+            <p:ph idx="1"/>
+          </p:nvPr>
+        </p:nvSpPr>
+        <p:spPr>
+          <a:xfrm>
+            <a:off x="381000" y="1412875"/>
+            <a:ext cx="8382000" cy="3939540"/>
+          </a:xfrm>
+        </p:spPr>
+        <p:txBody>
+          <a:bodyPr/>
+          <a:lstStyle/>
+          <a:p>
+            <a:r>
+              <a:rPr lang="en-US" dirty="0" smtClean="0"/>
+              <a:t>“</a:t>
+            </a:r>
+            <a:r>
+              <a:rPr lang="en-US" dirty="0" err="1" smtClean="0"/>
+              <a:t>LISt</a:t>
+            </a:r>
+            <a:r>
+              <a:rPr lang="en-US" dirty="0" smtClean="0"/>
+              <a:t> Processor”</a:t>
+            </a:r>
+          </a:p>
+          <a:p>
+            <a:r>
+              <a:rPr lang="en-US" dirty="0" smtClean="0"/>
+              <a:t>(Known as the language with all the parentheses)</a:t>
+            </a:r>
+          </a:p>
+          <a:p>
+            <a:r>
+              <a:rPr lang="en-US" dirty="0" smtClean="0"/>
+              <a:t>NOT a pure functional language</a:t>
+            </a:r>
+          </a:p>
+          <a:p>
+            <a:r>
+              <a:rPr lang="en-US" dirty="0" smtClean="0"/>
+              <a:t>Dynamically typed (mostly lists of any type)</a:t>
+            </a:r>
+          </a:p>
+          <a:p>
+            <a:r>
+              <a:rPr lang="en-US" dirty="0" smtClean="0"/>
+              <a:t>If you can recursively solve your problem, then do functions on first item in list, recursively do on rest of list</a:t>
+            </a:r>
+            <a:endParaRPr lang="en-US" dirty="0"/>
+          </a:p>
+        </p:txBody>
+      </p:sp>
+    </p:spTree>
+    <p:extLst>
+      <p:ext uri="{BB962C8B-B14F-4D97-AF65-F5344CB8AC3E}">
+        <p14:creationId xmlns:p14="http://schemas.microsoft.com/office/powerpoint/2010/main" val="2496181136"/>
+      </p:ext>
+    </p:extLst>
+  </p:cSld>
+  <p:clrMapOvr>
+    <a:masterClrMapping/>
+  </p:clrMapOvr>
+  <p:transition>
+    <p:fade/>
+  </p:transition>
+</p:sld>
+</file>
+
+<file path=ppt/slides/slide24.xml><?xml version="1.0" encoding="utf-8"?>
+<p:sld xmlns:a="http://schemas.openxmlformats.org/drawingml/2006/main" xmlns:r="http://schemas.openxmlformats.org/officeDocument/2006/relationships" xmlns:p="http://schemas.openxmlformats.org/presentationml/2006/main">
+  <p:cSld>
+    <p:spTree>
+      <p:nvGrpSpPr>
+        <p:cNvPr id="1" name=""/>
+        <p:cNvGrpSpPr/>
+        <p:nvPr/>
+      </p:nvGrpSpPr>
+      <p:grpSpPr>
+        <a:xfrm>
+          <a:off x="0" y="0"/>
+          <a:ext cx="0" cy="0"/>
+          <a:chOff x="0" y="0"/>
+          <a:chExt cx="0" cy="0"/>
+        </a:xfrm>
+      </p:grpSpPr>
+      <p:sp>
+        <p:nvSpPr>
+          <p:cNvPr id="2" name="Title 1"/>
+          <p:cNvSpPr>
+            <a:spLocks noGrp="1"/>
+          </p:cNvSpPr>
+          <p:nvPr>
+            <p:ph type="title"/>
+          </p:nvPr>
+        </p:nvSpPr>
+        <p:spPr/>
+        <p:txBody>
+          <a:bodyPr/>
+          <a:lstStyle/>
+          <a:p>
+            <a:r>
+              <a:rPr lang="en-US" dirty="0" smtClean="0"/>
+              <a:t>Languages - </a:t>
+            </a:r>
+            <a:r>
+              <a:rPr lang="en-US" dirty="0" err="1" smtClean="0"/>
+              <a:t>Clojure</a:t>
+            </a:r>
+            <a:endParaRPr lang="en-US" dirty="0"/>
+          </a:p>
+        </p:txBody>
+      </p:sp>
+      <p:sp>
+        <p:nvSpPr>
+          <p:cNvPr id="3" name="Content Placeholder 2"/>
+          <p:cNvSpPr>
+            <a:spLocks noGrp="1"/>
+          </p:cNvSpPr>
+          <p:nvPr>
+            <p:ph idx="1"/>
+          </p:nvPr>
+        </p:nvSpPr>
+        <p:spPr>
+          <a:xfrm>
+            <a:off x="381000" y="1412875"/>
+            <a:ext cx="8382000" cy="2511457"/>
+          </a:xfrm>
+        </p:spPr>
+        <p:txBody>
+          <a:bodyPr/>
+          <a:lstStyle/>
+          <a:p>
+            <a:r>
+              <a:rPr lang="en-US" dirty="0" smtClean="0"/>
+              <a:t>Dialect of LISP</a:t>
+            </a:r>
+          </a:p>
+          <a:p>
+            <a:r>
+              <a:rPr lang="en-US" dirty="0" smtClean="0"/>
+              <a:t>Dynamically typed</a:t>
+            </a:r>
+          </a:p>
+          <a:p>
+            <a:r>
+              <a:rPr lang="en-US" dirty="0" smtClean="0"/>
+              <a:t>Runs on Java Virtual Machine (JVM)</a:t>
+            </a:r>
+          </a:p>
+          <a:p>
+            <a:r>
+              <a:rPr lang="en-US" dirty="0" smtClean="0"/>
+              <a:t>Used by Amazon, Capital One, Cerner, Groupon, Spotify, many others</a:t>
+            </a:r>
+            <a:endParaRPr lang="en-US" dirty="0"/>
+          </a:p>
+        </p:txBody>
+      </p:sp>
+    </p:spTree>
+    <p:extLst>
+      <p:ext uri="{BB962C8B-B14F-4D97-AF65-F5344CB8AC3E}">
+        <p14:creationId xmlns:p14="http://schemas.microsoft.com/office/powerpoint/2010/main" val="3250039605"/>
+      </p:ext>
+    </p:extLst>
+  </p:cSld>
+  <p:clrMapOvr>
+    <a:masterClrMapping/>
+  </p:clrMapOvr>
+  <p:transition>
+    <p:fade/>
+  </p:transition>
+</p:sld>
+</file>
+
+<file path=ppt/slides/slide25.xml><?xml version="1.0" encoding="utf-8"?>
+<p:sld xmlns:a="http://schemas.openxmlformats.org/drawingml/2006/main" xmlns:r="http://schemas.openxmlformats.org/officeDocument/2006/relationships" xmlns:p="http://schemas.openxmlformats.org/presentationml/2006/main">
+  <p:cSld>
+    <p:spTree>
+      <p:nvGrpSpPr>
+        <p:cNvPr id="1" name=""/>
+        <p:cNvGrpSpPr/>
+        <p:nvPr/>
+      </p:nvGrpSpPr>
+      <p:grpSpPr>
+        <a:xfrm>
+          <a:off x="0" y="0"/>
+          <a:ext cx="0" cy="0"/>
+          <a:chOff x="0" y="0"/>
+          <a:chExt cx="0" cy="0"/>
+        </a:xfrm>
+      </p:grpSpPr>
+      <p:sp>
+        <p:nvSpPr>
+          <p:cNvPr id="2" name="Title 1"/>
+          <p:cNvSpPr>
+            <a:spLocks noGrp="1"/>
+          </p:cNvSpPr>
+          <p:nvPr>
+            <p:ph type="title"/>
+          </p:nvPr>
+        </p:nvSpPr>
+        <p:spPr/>
+        <p:txBody>
+          <a:bodyPr/>
+          <a:lstStyle/>
+          <a:p>
+            <a:r>
+              <a:rPr lang="en-US" dirty="0" smtClean="0"/>
+              <a:t>Languages - </a:t>
+            </a:r>
+            <a:r>
+              <a:rPr lang="en-US" dirty="0" err="1" smtClean="0"/>
+              <a:t>Clojure</a:t>
+            </a:r>
+            <a:endParaRPr lang="en-US" dirty="0"/>
+          </a:p>
+        </p:txBody>
+      </p:sp>
+      <p:sp>
+        <p:nvSpPr>
+          <p:cNvPr id="3" name="Content Placeholder 2"/>
+          <p:cNvSpPr>
+            <a:spLocks noGrp="1"/>
+          </p:cNvSpPr>
+          <p:nvPr>
+            <p:ph idx="1"/>
+          </p:nvPr>
+        </p:nvSpPr>
+        <p:spPr>
+          <a:xfrm>
+            <a:off x="381000" y="1412875"/>
+            <a:ext cx="8382000" cy="2511457"/>
+          </a:xfrm>
+        </p:spPr>
+        <p:txBody>
+          <a:bodyPr/>
+          <a:lstStyle/>
+          <a:p>
+            <a:r>
+              <a:rPr lang="en-US" dirty="0" smtClean="0"/>
+              <a:t>Dialect of LISP</a:t>
+            </a:r>
+          </a:p>
+          <a:p>
+            <a:r>
+              <a:rPr lang="en-US" dirty="0" smtClean="0"/>
+              <a:t>Dynamically typed</a:t>
+            </a:r>
+          </a:p>
+          <a:p>
+            <a:r>
+              <a:rPr lang="en-US" dirty="0" smtClean="0"/>
+              <a:t>Runs on Java Virtual Machine (JVM)</a:t>
+            </a:r>
+          </a:p>
+          <a:p>
+            <a:r>
+              <a:rPr lang="en-US" dirty="0" smtClean="0"/>
+              <a:t>Used by Amazon, Capital One, Cerner, Groupon, Spotify, many others</a:t>
+            </a:r>
+            <a:endParaRPr lang="en-US" dirty="0"/>
+          </a:p>
+        </p:txBody>
+      </p:sp>
+    </p:spTree>
+    <p:extLst>
+      <p:ext uri="{BB962C8B-B14F-4D97-AF65-F5344CB8AC3E}">
+        <p14:creationId xmlns:p14="http://schemas.microsoft.com/office/powerpoint/2010/main" val="325605316"/>
+      </p:ext>
+    </p:extLst>
+  </p:cSld>
+  <p:clrMapOvr>
+    <a:masterClrMapping/>
+  </p:clrMapOvr>
+  <p:transition>
+    <p:fade/>
+  </p:transition>
+</p:sld>
+</file>
+
+<file path=ppt/slides/slide26.xml><?xml version="1.0" encoding="utf-8"?>
+<p:sld xmlns:a="http://schemas.openxmlformats.org/drawingml/2006/main" xmlns:r="http://schemas.openxmlformats.org/officeDocument/2006/relationships" xmlns:p="http://schemas.openxmlformats.org/presentationml/2006/main">
+  <p:cSld>
+    <p:spTree>
+      <p:nvGrpSpPr>
+        <p:cNvPr id="1" name=""/>
+        <p:cNvGrpSpPr/>
+        <p:nvPr/>
+      </p:nvGrpSpPr>
+      <p:grpSpPr>
+        <a:xfrm>
+          <a:off x="0" y="0"/>
+          <a:ext cx="0" cy="0"/>
+          <a:chOff x="0" y="0"/>
+          <a:chExt cx="0" cy="0"/>
+        </a:xfrm>
+      </p:grpSpPr>
+      <p:sp>
+        <p:nvSpPr>
+          <p:cNvPr id="2" name="Title 1"/>
+          <p:cNvSpPr>
+            <a:spLocks noGrp="1"/>
+          </p:cNvSpPr>
+          <p:nvPr>
+            <p:ph type="title"/>
+          </p:nvPr>
+        </p:nvSpPr>
+        <p:spPr/>
+        <p:txBody>
+          <a:bodyPr/>
+          <a:lstStyle/>
+          <a:p>
+            <a:r>
+              <a:rPr lang="en-US" dirty="0" smtClean="0"/>
+              <a:t>Languages – F#</a:t>
+            </a:r>
+            <a:endParaRPr lang="en-US" dirty="0"/>
+          </a:p>
+        </p:txBody>
+      </p:sp>
+      <p:sp>
+        <p:nvSpPr>
+          <p:cNvPr id="3" name="Content Placeholder 2"/>
+          <p:cNvSpPr>
+            <a:spLocks noGrp="1"/>
+          </p:cNvSpPr>
+          <p:nvPr>
+            <p:ph idx="1"/>
+          </p:nvPr>
+        </p:nvSpPr>
+        <p:spPr>
+          <a:xfrm>
+            <a:off x="381000" y="1412875"/>
+            <a:ext cx="8382000" cy="3053144"/>
+          </a:xfrm>
+        </p:spPr>
+        <p:txBody>
+          <a:bodyPr/>
+          <a:lstStyle/>
+          <a:p>
+            <a:r>
+              <a:rPr lang="en-US" dirty="0" smtClean="0"/>
+              <a:t>Functional and Object Oriented (compiles into </a:t>
+            </a:r>
+            <a:r>
+              <a:rPr lang="en-US" dirty="0" err="1" smtClean="0"/>
+              <a:t>.Net</a:t>
+            </a:r>
+            <a:r>
+              <a:rPr lang="en-US" dirty="0" smtClean="0"/>
+              <a:t>)</a:t>
+            </a:r>
+          </a:p>
+          <a:p>
+            <a:r>
+              <a:rPr lang="en-US" dirty="0" smtClean="0"/>
+              <a:t>Based on </a:t>
+            </a:r>
+            <a:r>
+              <a:rPr lang="en-US" dirty="0" err="1" smtClean="0"/>
+              <a:t>Ocaml</a:t>
+            </a:r>
+            <a:r>
+              <a:rPr lang="en-US" dirty="0" smtClean="0"/>
+              <a:t> and C#</a:t>
+            </a:r>
+          </a:p>
+          <a:p>
+            <a:r>
+              <a:rPr lang="en-US" dirty="0"/>
+              <a:t>Strongly typed, but inferred</a:t>
+            </a:r>
+          </a:p>
+          <a:p>
+            <a:r>
+              <a:rPr lang="en-US" dirty="0" smtClean="0"/>
+              <a:t>Every statement returns a type</a:t>
+            </a:r>
+          </a:p>
+          <a:p>
+            <a:r>
+              <a:rPr lang="en-US" dirty="0" smtClean="0"/>
+              <a:t>Parallelism is easily built into language</a:t>
+            </a:r>
+            <a:endParaRPr lang="en-US" dirty="0"/>
+          </a:p>
+        </p:txBody>
+      </p:sp>
+    </p:spTree>
+    <p:extLst>
+      <p:ext uri="{BB962C8B-B14F-4D97-AF65-F5344CB8AC3E}">
+        <p14:creationId xmlns:p14="http://schemas.microsoft.com/office/powerpoint/2010/main" val="3128902548"/>
+      </p:ext>
+    </p:extLst>
+  </p:cSld>
+  <p:clrMapOvr>
+    <a:masterClrMapping/>
+  </p:clrMapOvr>
+  <p:transition>
+    <p:fade/>
+  </p:transition>
+</p:sld>
+</file>
+
+<file path=ppt/slides/slide27.xml><?xml version="1.0" encoding="utf-8"?>
+<p:sld xmlns:a="http://schemas.openxmlformats.org/drawingml/2006/main" xmlns:r="http://schemas.openxmlformats.org/officeDocument/2006/relationships" xmlns:p="http://schemas.openxmlformats.org/presentationml/2006/main">
+  <p:cSld>
+    <p:spTree>
+      <p:nvGrpSpPr>
+        <p:cNvPr id="1" name=""/>
+        <p:cNvGrpSpPr/>
+        <p:nvPr/>
+      </p:nvGrpSpPr>
+      <p:grpSpPr>
+        <a:xfrm>
+          <a:off x="0" y="0"/>
+          <a:ext cx="0" cy="0"/>
+          <a:chOff x="0" y="0"/>
+          <a:chExt cx="0" cy="0"/>
+        </a:xfrm>
+      </p:grpSpPr>
+      <p:sp>
+        <p:nvSpPr>
+          <p:cNvPr id="2" name="Title 1"/>
+          <p:cNvSpPr>
+            <a:spLocks noGrp="1"/>
+          </p:cNvSpPr>
+          <p:nvPr>
+            <p:ph type="title"/>
+          </p:nvPr>
+        </p:nvSpPr>
+        <p:spPr/>
+        <p:txBody>
+          <a:bodyPr/>
+          <a:lstStyle/>
+          <a:p>
+            <a:r>
+              <a:rPr lang="en-US" dirty="0" smtClean="0"/>
+              <a:t>Conclusion</a:t>
+            </a:r>
+            <a:endParaRPr lang="en-US" dirty="0"/>
+          </a:p>
+        </p:txBody>
+      </p:sp>
+      <p:sp>
+        <p:nvSpPr>
+          <p:cNvPr id="3" name="Content Placeholder 2"/>
+          <p:cNvSpPr>
+            <a:spLocks noGrp="1"/>
+          </p:cNvSpPr>
+          <p:nvPr>
+            <p:ph idx="1"/>
+          </p:nvPr>
+        </p:nvSpPr>
+        <p:spPr>
+          <a:xfrm>
+            <a:off x="381000" y="1412875"/>
+            <a:ext cx="8382000" cy="2856167"/>
+          </a:xfrm>
+        </p:spPr>
+        <p:txBody>
+          <a:bodyPr/>
+          <a:lstStyle/>
+          <a:p>
+            <a:r>
+              <a:rPr lang="en-US" dirty="0" smtClean="0"/>
+              <a:t>Functional Programming is getting popular, but been around for decades</a:t>
+            </a:r>
+          </a:p>
+          <a:p>
+            <a:r>
+              <a:rPr lang="en-US" dirty="0" smtClean="0"/>
+              <a:t>Adopting functional principles will make your code simpler, smaller, and more reliable</a:t>
+            </a:r>
+          </a:p>
+          <a:p>
+            <a:r>
+              <a:rPr lang="en-US" dirty="0" smtClean="0"/>
+              <a:t>Several different types of functional languages and how they’re built</a:t>
+            </a:r>
+          </a:p>
+        </p:txBody>
+      </p:sp>
+    </p:spTree>
+    <p:extLst>
+      <p:ext uri="{BB962C8B-B14F-4D97-AF65-F5344CB8AC3E}">
+        <p14:creationId xmlns:p14="http://schemas.microsoft.com/office/powerpoint/2010/main" val="2533288499"/>
+      </p:ext>
+    </p:extLst>
+  </p:cSld>
+  <p:clrMapOvr>
+    <a:masterClrMapping/>
+  </p:clrMapOvr>
+  <p:transition>
+    <p:fade/>
+  </p:transition>
+</p:sld>
+</file>
+
+<file path=ppt/slides/slide28.xml><?xml version="1.0" encoding="utf-8"?>
+<p:sld xmlns:a="http://schemas.openxmlformats.org/drawingml/2006/main" xmlns:r="http://schemas.openxmlformats.org/officeDocument/2006/relationships" xmlns:p="http://schemas.openxmlformats.org/presentationml/2006/main">
+  <p:cSld>
+    <p:spTree>
+      <p:nvGrpSpPr>
+        <p:cNvPr id="1" name=""/>
+        <p:cNvGrpSpPr/>
+        <p:nvPr/>
+      </p:nvGrpSpPr>
+      <p:grpSpPr>
+        <a:xfrm>
+          <a:off x="0" y="0"/>
+          <a:ext cx="0" cy="0"/>
+          <a:chOff x="0" y="0"/>
+          <a:chExt cx="0" cy="0"/>
+        </a:xfrm>
+      </p:grpSpPr>
+      <p:sp>
+        <p:nvSpPr>
+          <p:cNvPr id="2" name="Title 1"/>
+          <p:cNvSpPr>
+            <a:spLocks noGrp="1"/>
+          </p:cNvSpPr>
+          <p:nvPr>
+            <p:ph type="title"/>
+          </p:nvPr>
+        </p:nvSpPr>
+        <p:spPr/>
+        <p:txBody>
+          <a:bodyPr/>
+          <a:lstStyle/>
+          <a:p>
+            <a:r>
+              <a:rPr lang="en-US" dirty="0" smtClean="0"/>
+              <a:t>Conclusion</a:t>
+            </a:r>
+            <a:endParaRPr lang="en-US" dirty="0"/>
+          </a:p>
+        </p:txBody>
+      </p:sp>
+      <p:sp>
+        <p:nvSpPr>
+          <p:cNvPr id="3" name="Content Placeholder 2"/>
+          <p:cNvSpPr>
+            <a:spLocks noGrp="1"/>
+          </p:cNvSpPr>
+          <p:nvPr>
+            <p:ph idx="1"/>
+          </p:nvPr>
+        </p:nvSpPr>
+        <p:spPr>
+          <a:xfrm>
+            <a:off x="381000" y="1412875"/>
+            <a:ext cx="8382000" cy="3053144"/>
+          </a:xfrm>
+        </p:spPr>
+        <p:txBody>
+          <a:bodyPr/>
+          <a:lstStyle/>
+          <a:p>
+            <a:pPr marL="0" indent="0">
+              <a:buNone/>
+            </a:pPr>
+            <a:r>
+              <a:rPr lang="en-US" dirty="0" smtClean="0"/>
+              <a:t>Sarah Withee</a:t>
+            </a:r>
+          </a:p>
+          <a:p>
+            <a:pPr marL="0" indent="0">
+              <a:buNone/>
+            </a:pPr>
+            <a:r>
+              <a:rPr lang="en-US" dirty="0" smtClean="0"/>
+              <a:t>@geekygirlsarah on Twitter</a:t>
+            </a:r>
+          </a:p>
+          <a:p>
+            <a:pPr marL="0" indent="0">
+              <a:buNone/>
+            </a:pPr>
+            <a:r>
+              <a:rPr lang="en-US" dirty="0" smtClean="0"/>
+              <a:t>sarah@sarahwithee.com</a:t>
+            </a:r>
+          </a:p>
+          <a:p>
+            <a:pPr marL="0" indent="0">
+              <a:buNone/>
+            </a:pPr>
+            <a:endParaRPr lang="en-US" dirty="0" smtClean="0"/>
+          </a:p>
+          <a:p>
+            <a:pPr marL="0" indent="0">
+              <a:buNone/>
+            </a:pPr>
+            <a:r>
+              <a:rPr lang="en-US" dirty="0" smtClean="0"/>
+              <a:t>(I give this again in 2 days. I’d love </a:t>
+            </a:r>
+            <a:r>
+              <a:rPr lang="en-US" b="1" i="1" dirty="0" smtClean="0"/>
+              <a:t>ALL </a:t>
+            </a:r>
+            <a:r>
+              <a:rPr lang="en-US" dirty="0" smtClean="0"/>
+              <a:t>the feedback I can get!)</a:t>
+            </a:r>
+          </a:p>
+        </p:txBody>
+      </p:sp>
+    </p:spTree>
+    <p:extLst>
+      <p:ext uri="{BB962C8B-B14F-4D97-AF65-F5344CB8AC3E}">
+        <p14:creationId xmlns:p14="http://schemas.microsoft.com/office/powerpoint/2010/main" val="313274160"/>
       </p:ext>
     </p:extLst>
   </p:cSld>
@@ -4811,7 +7453,7 @@
         <p:spPr>
           <a:xfrm>
             <a:off x="381000" y="1412875"/>
-            <a:ext cx="8382000" cy="1391150"/>
+            <a:ext cx="8382000" cy="3028521"/>
           </a:xfrm>
         </p:spPr>
         <p:txBody>
@@ -4827,16 +7469,40 @@
             <a:pPr lvl="1"/>
             <a:r>
               <a:rPr lang="en-US" dirty="0" smtClean="0"/>
-              <a:t>sin(x)  - always produces sine </a:t>
-            </a:r>
-            <a:r>
-              <a:rPr lang="en-US" smtClean="0"/>
-              <a:t>of value at x</a:t>
+              <a:t>sin(x</a:t>
+            </a:r>
+            <a:r>
+              <a:rPr lang="en-US" dirty="0" smtClean="0"/>
+              <a:t>) – always produces </a:t>
+            </a:r>
+            <a:r>
+              <a:rPr lang="en-US" dirty="0" smtClean="0"/>
+              <a:t>sine of value at </a:t>
+            </a:r>
+            <a:r>
+              <a:rPr lang="en-US" dirty="0" smtClean="0"/>
+              <a:t>x</a:t>
             </a:r>
           </a:p>
           <a:p>
             <a:pPr lvl="1"/>
-            <a:endParaRPr lang="en-US" dirty="0"/>
+            <a:r>
+              <a:rPr lang="en-US" dirty="0" smtClean="0"/>
+              <a:t>length(x) – always returns the same size of the string</a:t>
+            </a:r>
+            <a:endParaRPr lang="en-US" dirty="0" smtClean="0"/>
+          </a:p>
+          <a:p>
+            <a:pPr lvl="1"/>
+            <a:r>
+              <a:rPr lang="en-US" dirty="0" err="1" smtClean="0"/>
+              <a:t>getAccountNumberFromDb</a:t>
+            </a:r>
+            <a:r>
+              <a:rPr lang="en-US" dirty="0" smtClean="0"/>
+              <a:t>(name) – kidding. Not pure because it relies on a database that may not may not produce the same result each time</a:t>
+            </a:r>
+            <a:endParaRPr lang="en-US" dirty="0" smtClean="0"/>
           </a:p>
         </p:txBody>
       </p:sp>
@@ -4844,6 +7510,574 @@
     <p:extLst>
       <p:ext uri="{BB962C8B-B14F-4D97-AF65-F5344CB8AC3E}">
         <p14:creationId xmlns:p14="http://schemas.microsoft.com/office/powerpoint/2010/main" val="4157762634"/>
+      </p:ext>
+    </p:extLst>
+  </p:cSld>
+  <p:clrMapOvr>
+    <a:masterClrMapping/>
+  </p:clrMapOvr>
+  <p:transition>
+    <p:fade/>
+  </p:transition>
+</p:sld>
+</file>
+
+<file path=ppt/slides/slide6.xml><?xml version="1.0" encoding="utf-8"?>
+<p:sld xmlns:a="http://schemas.openxmlformats.org/drawingml/2006/main" xmlns:r="http://schemas.openxmlformats.org/officeDocument/2006/relationships" xmlns:p="http://schemas.openxmlformats.org/presentationml/2006/main">
+  <p:cSld>
+    <p:spTree>
+      <p:nvGrpSpPr>
+        <p:cNvPr id="1" name=""/>
+        <p:cNvGrpSpPr/>
+        <p:nvPr/>
+      </p:nvGrpSpPr>
+      <p:grpSpPr>
+        <a:xfrm>
+          <a:off x="0" y="0"/>
+          <a:ext cx="0" cy="0"/>
+          <a:chOff x="0" y="0"/>
+          <a:chExt cx="0" cy="0"/>
+        </a:xfrm>
+      </p:grpSpPr>
+      <p:sp>
+        <p:nvSpPr>
+          <p:cNvPr id="2" name="Title 1"/>
+          <p:cNvSpPr>
+            <a:spLocks noGrp="1"/>
+          </p:cNvSpPr>
+          <p:nvPr>
+            <p:ph type="title"/>
+          </p:nvPr>
+        </p:nvSpPr>
+        <p:spPr/>
+        <p:txBody>
+          <a:bodyPr/>
+          <a:lstStyle/>
+          <a:p>
+            <a:r>
+              <a:rPr lang="en-US" dirty="0" smtClean="0"/>
+              <a:t>Explaining Functional Programming</a:t>
+            </a:r>
+            <a:endParaRPr lang="en-US" dirty="0"/>
+          </a:p>
+        </p:txBody>
+      </p:sp>
+      <p:sp>
+        <p:nvSpPr>
+          <p:cNvPr id="3" name="Content Placeholder 2"/>
+          <p:cNvSpPr>
+            <a:spLocks noGrp="1"/>
+          </p:cNvSpPr>
+          <p:nvPr>
+            <p:ph idx="1"/>
+          </p:nvPr>
+        </p:nvSpPr>
+        <p:spPr>
+          <a:xfrm>
+            <a:off x="381000" y="1412875"/>
+            <a:ext cx="8382000" cy="3804118"/>
+          </a:xfrm>
+        </p:spPr>
+        <p:txBody>
+          <a:bodyPr/>
+          <a:lstStyle/>
+          <a:p>
+            <a:r>
+              <a:rPr lang="en-US" dirty="0" smtClean="0"/>
+              <a:t>Referential Transparency</a:t>
+            </a:r>
+          </a:p>
+          <a:p>
+            <a:pPr lvl="1"/>
+            <a:r>
+              <a:rPr lang="en-US" dirty="0" smtClean="0"/>
+              <a:t>Any expression that can replace its value with no behavior changes</a:t>
+            </a:r>
+          </a:p>
+          <a:p>
+            <a:pPr lvl="1"/>
+            <a:r>
+              <a:rPr lang="en-US" dirty="0" smtClean="0"/>
+              <a:t>Ex: x = 3</a:t>
+            </a:r>
+            <a:br>
+              <a:rPr lang="en-US" dirty="0" smtClean="0"/>
+            </a:br>
+            <a:r>
+              <a:rPr lang="en-US" dirty="0" smtClean="0"/>
+              <a:t>      x + 5 = 8</a:t>
+            </a:r>
+            <a:r>
+              <a:rPr lang="en-US" dirty="0"/>
+              <a:t/>
+            </a:r>
+            <a:br>
+              <a:rPr lang="en-US" dirty="0"/>
+            </a:br>
+            <a:r>
+              <a:rPr lang="en-US" dirty="0" smtClean="0"/>
+              <a:t>      3 + 5 = 8</a:t>
+            </a:r>
+            <a:br>
+              <a:rPr lang="en-US" dirty="0" smtClean="0"/>
+            </a:br>
+            <a:r>
+              <a:rPr lang="en-US" dirty="0" smtClean="0"/>
+              <a:t>Both result in the same value with no behavior changes</a:t>
+            </a:r>
+          </a:p>
+          <a:p>
+            <a:pPr marL="517525" lvl="1" indent="0">
+              <a:buNone/>
+            </a:pPr>
+            <a:endParaRPr lang="en-US" dirty="0" smtClean="0"/>
+          </a:p>
+        </p:txBody>
+      </p:sp>
+    </p:spTree>
+    <p:extLst>
+      <p:ext uri="{BB962C8B-B14F-4D97-AF65-F5344CB8AC3E}">
+        <p14:creationId xmlns:p14="http://schemas.microsoft.com/office/powerpoint/2010/main" val="2455458872"/>
+      </p:ext>
+    </p:extLst>
+  </p:cSld>
+  <p:clrMapOvr>
+    <a:masterClrMapping/>
+  </p:clrMapOvr>
+  <p:transition>
+    <p:fade/>
+  </p:transition>
+</p:sld>
+</file>
+
+<file path=ppt/slides/slide7.xml><?xml version="1.0" encoding="utf-8"?>
+<p:sld xmlns:a="http://schemas.openxmlformats.org/drawingml/2006/main" xmlns:r="http://schemas.openxmlformats.org/officeDocument/2006/relationships" xmlns:p="http://schemas.openxmlformats.org/presentationml/2006/main">
+  <p:cSld>
+    <p:spTree>
+      <p:nvGrpSpPr>
+        <p:cNvPr id="1" name=""/>
+        <p:cNvGrpSpPr/>
+        <p:nvPr/>
+      </p:nvGrpSpPr>
+      <p:grpSpPr>
+        <a:xfrm>
+          <a:off x="0" y="0"/>
+          <a:ext cx="0" cy="0"/>
+          <a:chOff x="0" y="0"/>
+          <a:chExt cx="0" cy="0"/>
+        </a:xfrm>
+      </p:grpSpPr>
+      <p:sp>
+        <p:nvSpPr>
+          <p:cNvPr id="2" name="Title 1"/>
+          <p:cNvSpPr>
+            <a:spLocks noGrp="1"/>
+          </p:cNvSpPr>
+          <p:nvPr>
+            <p:ph type="title"/>
+          </p:nvPr>
+        </p:nvSpPr>
+        <p:spPr/>
+        <p:txBody>
+          <a:bodyPr/>
+          <a:lstStyle/>
+          <a:p>
+            <a:r>
+              <a:rPr lang="en-US" dirty="0" smtClean="0"/>
+              <a:t>Explaining Functional Programming</a:t>
+            </a:r>
+            <a:endParaRPr lang="en-US" dirty="0"/>
+          </a:p>
+        </p:txBody>
+      </p:sp>
+      <p:sp>
+        <p:nvSpPr>
+          <p:cNvPr id="3" name="Content Placeholder 2"/>
+          <p:cNvSpPr>
+            <a:spLocks noGrp="1"/>
+          </p:cNvSpPr>
+          <p:nvPr>
+            <p:ph idx="1"/>
+          </p:nvPr>
+        </p:nvSpPr>
+        <p:spPr>
+          <a:xfrm>
+            <a:off x="381000" y="1412875"/>
+            <a:ext cx="8382000" cy="2813078"/>
+          </a:xfrm>
+        </p:spPr>
+        <p:txBody>
+          <a:bodyPr/>
+          <a:lstStyle/>
+          <a:p>
+            <a:r>
+              <a:rPr lang="en-US" dirty="0" smtClean="0"/>
+              <a:t>Referential Transparency</a:t>
+            </a:r>
+          </a:p>
+          <a:p>
+            <a:pPr lvl="1"/>
+            <a:r>
+              <a:rPr lang="en-US" dirty="0" smtClean="0"/>
+              <a:t>Referential opacity – the opposite</a:t>
+            </a:r>
+          </a:p>
+          <a:p>
+            <a:pPr lvl="1"/>
+            <a:r>
+              <a:rPr lang="en-US" dirty="0" smtClean="0"/>
+              <a:t>In mathematics, all functions are transparent.</a:t>
+            </a:r>
+          </a:p>
+          <a:p>
+            <a:pPr lvl="1"/>
+            <a:r>
+              <a:rPr lang="en-US" dirty="0" smtClean="0"/>
+              <a:t>In programming, this is not the case</a:t>
+            </a:r>
+          </a:p>
+          <a:p>
+            <a:pPr lvl="1"/>
+            <a:r>
+              <a:rPr lang="en-US" dirty="0" smtClean="0"/>
+              <a:t>Pure functions always have referential transparency</a:t>
+            </a:r>
+          </a:p>
+          <a:p>
+            <a:pPr marL="517525" lvl="1" indent="0">
+              <a:buNone/>
+            </a:pPr>
+            <a:endParaRPr lang="en-US" dirty="0" smtClean="0"/>
+          </a:p>
+        </p:txBody>
+      </p:sp>
+    </p:spTree>
+    <p:extLst>
+      <p:ext uri="{BB962C8B-B14F-4D97-AF65-F5344CB8AC3E}">
+        <p14:creationId xmlns:p14="http://schemas.microsoft.com/office/powerpoint/2010/main" val="1961813044"/>
+      </p:ext>
+    </p:extLst>
+  </p:cSld>
+  <p:clrMapOvr>
+    <a:masterClrMapping/>
+  </p:clrMapOvr>
+  <p:transition>
+    <p:fade/>
+  </p:transition>
+</p:sld>
+</file>
+
+<file path=ppt/slides/slide8.xml><?xml version="1.0" encoding="utf-8"?>
+<p:sld xmlns:a="http://schemas.openxmlformats.org/drawingml/2006/main" xmlns:r="http://schemas.openxmlformats.org/officeDocument/2006/relationships" xmlns:p="http://schemas.openxmlformats.org/presentationml/2006/main">
+  <p:cSld>
+    <p:spTree>
+      <p:nvGrpSpPr>
+        <p:cNvPr id="1" name=""/>
+        <p:cNvGrpSpPr/>
+        <p:nvPr/>
+      </p:nvGrpSpPr>
+      <p:grpSpPr>
+        <a:xfrm>
+          <a:off x="0" y="0"/>
+          <a:ext cx="0" cy="0"/>
+          <a:chOff x="0" y="0"/>
+          <a:chExt cx="0" cy="0"/>
+        </a:xfrm>
+      </p:grpSpPr>
+      <p:sp>
+        <p:nvSpPr>
+          <p:cNvPr id="2" name="Title 1"/>
+          <p:cNvSpPr>
+            <a:spLocks noGrp="1"/>
+          </p:cNvSpPr>
+          <p:nvPr>
+            <p:ph type="title"/>
+          </p:nvPr>
+        </p:nvSpPr>
+        <p:spPr/>
+        <p:txBody>
+          <a:bodyPr/>
+          <a:lstStyle/>
+          <a:p>
+            <a:r>
+              <a:rPr lang="en-US" dirty="0" smtClean="0"/>
+              <a:t>Explaining Functional Programming</a:t>
+            </a:r>
+            <a:endParaRPr lang="en-US" dirty="0"/>
+          </a:p>
+        </p:txBody>
+      </p:sp>
+      <p:sp>
+        <p:nvSpPr>
+          <p:cNvPr id="3" name="Content Placeholder 2"/>
+          <p:cNvSpPr>
+            <a:spLocks noGrp="1"/>
+          </p:cNvSpPr>
+          <p:nvPr>
+            <p:ph idx="1"/>
+          </p:nvPr>
+        </p:nvSpPr>
+        <p:spPr>
+          <a:xfrm>
+            <a:off x="381000" y="1412875"/>
+            <a:ext cx="8382000" cy="2917722"/>
+          </a:xfrm>
+        </p:spPr>
+        <p:txBody>
+          <a:bodyPr/>
+          <a:lstStyle/>
+          <a:p>
+            <a:r>
+              <a:rPr lang="en-US" dirty="0" smtClean="0"/>
+              <a:t>Referential Transparency</a:t>
+            </a:r>
+          </a:p>
+          <a:p>
+            <a:pPr lvl="1"/>
+            <a:r>
+              <a:rPr lang="en-US" sz="2400" dirty="0"/>
+              <a:t>Assignments are NOT </a:t>
+            </a:r>
+            <a:r>
+              <a:rPr lang="en-US" sz="2400" dirty="0" smtClean="0"/>
+              <a:t>transparent</a:t>
+            </a:r>
+            <a:br>
+              <a:rPr lang="en-US" sz="2400" dirty="0" smtClean="0"/>
+            </a:br>
+            <a:r>
+              <a:rPr lang="en-US" sz="2400" dirty="0" smtClean="0"/>
+              <a:t/>
+            </a:r>
+            <a:br>
+              <a:rPr lang="en-US" sz="2400" dirty="0" smtClean="0"/>
+            </a:br>
+            <a:r>
+              <a:rPr lang="en-US" sz="2400" dirty="0" smtClean="0"/>
+              <a:t>x </a:t>
+            </a:r>
+            <a:r>
+              <a:rPr lang="en-US" sz="2400" dirty="0"/>
+              <a:t>= x + 1   </a:t>
+            </a:r>
+            <a:r>
+              <a:rPr lang="en-US" sz="2400" dirty="0" smtClean="0"/>
+              <a:t>                 </a:t>
+            </a:r>
+            <a:br>
+              <a:rPr lang="en-US" sz="2400" dirty="0" smtClean="0"/>
+            </a:br>
+            <a:r>
+              <a:rPr lang="en-US" sz="2400" dirty="0" smtClean="0"/>
+              <a:t/>
+            </a:r>
+            <a:br>
+              <a:rPr lang="en-US" sz="2400" dirty="0" smtClean="0"/>
+            </a:br>
+            <a:r>
+              <a:rPr lang="en-US" sz="2400" dirty="0" err="1" smtClean="0"/>
+              <a:t>int</a:t>
+            </a:r>
+            <a:r>
+              <a:rPr lang="en-US" sz="2400" dirty="0" smtClean="0"/>
+              <a:t> </a:t>
+            </a:r>
+            <a:r>
+              <a:rPr lang="en-US" sz="2400" dirty="0" err="1"/>
+              <a:t>addOne</a:t>
+            </a:r>
+            <a:r>
+              <a:rPr lang="en-US" sz="2400" dirty="0"/>
+              <a:t>(</a:t>
+            </a:r>
+            <a:r>
+              <a:rPr lang="en-US" sz="2400" dirty="0" err="1"/>
+              <a:t>int</a:t>
+            </a:r>
+            <a:r>
+              <a:rPr lang="en-US" sz="2400" dirty="0"/>
+              <a:t> x) { return x + 1; }     </a:t>
+            </a:r>
+            <a:br>
+              <a:rPr lang="en-US" sz="2400" dirty="0"/>
+            </a:br>
+            <a:endParaRPr lang="en-US" sz="2400" dirty="0" smtClean="0"/>
+          </a:p>
+          <a:p>
+            <a:pPr marL="914400" lvl="2" indent="0">
+              <a:buNone/>
+            </a:pPr>
+            <a:r>
+              <a:rPr lang="en-US" dirty="0" err="1" smtClean="0"/>
+              <a:t>addOne</a:t>
+            </a:r>
+            <a:r>
+              <a:rPr lang="en-US" dirty="0" smtClean="0"/>
+              <a:t>(x</a:t>
+            </a:r>
+            <a:r>
+              <a:rPr lang="en-US" dirty="0"/>
+              <a:t>) = </a:t>
+            </a:r>
+            <a:r>
+              <a:rPr lang="en-US" dirty="0" err="1"/>
+              <a:t>addOne</a:t>
+            </a:r>
+            <a:r>
+              <a:rPr lang="en-US" dirty="0"/>
+              <a:t> (y</a:t>
+            </a:r>
+            <a:r>
+              <a:rPr lang="en-US" dirty="0" smtClean="0"/>
+              <a:t>);</a:t>
+            </a:r>
+          </a:p>
+        </p:txBody>
+      </p:sp>
+    </p:spTree>
+    <p:extLst>
+      <p:ext uri="{BB962C8B-B14F-4D97-AF65-F5344CB8AC3E}">
+        <p14:creationId xmlns:p14="http://schemas.microsoft.com/office/powerpoint/2010/main" val="3112035102"/>
+      </p:ext>
+    </p:extLst>
+  </p:cSld>
+  <p:clrMapOvr>
+    <a:masterClrMapping/>
+  </p:clrMapOvr>
+  <p:transition>
+    <p:fade/>
+  </p:transition>
+</p:sld>
+</file>
+
+<file path=ppt/slides/slide9.xml><?xml version="1.0" encoding="utf-8"?>
+<p:sld xmlns:a="http://schemas.openxmlformats.org/drawingml/2006/main" xmlns:r="http://schemas.openxmlformats.org/officeDocument/2006/relationships" xmlns:p="http://schemas.openxmlformats.org/presentationml/2006/main">
+  <p:cSld>
+    <p:spTree>
+      <p:nvGrpSpPr>
+        <p:cNvPr id="1" name=""/>
+        <p:cNvGrpSpPr/>
+        <p:nvPr/>
+      </p:nvGrpSpPr>
+      <p:grpSpPr>
+        <a:xfrm>
+          <a:off x="0" y="0"/>
+          <a:ext cx="0" cy="0"/>
+          <a:chOff x="0" y="0"/>
+          <a:chExt cx="0" cy="0"/>
+        </a:xfrm>
+      </p:grpSpPr>
+      <p:sp>
+        <p:nvSpPr>
+          <p:cNvPr id="2" name="Title 1"/>
+          <p:cNvSpPr>
+            <a:spLocks noGrp="1"/>
+          </p:cNvSpPr>
+          <p:nvPr>
+            <p:ph type="title"/>
+          </p:nvPr>
+        </p:nvSpPr>
+        <p:spPr/>
+        <p:txBody>
+          <a:bodyPr/>
+          <a:lstStyle/>
+          <a:p>
+            <a:r>
+              <a:rPr lang="en-US" dirty="0" smtClean="0"/>
+              <a:t>Explaining Functional Programming</a:t>
+            </a:r>
+            <a:endParaRPr lang="en-US" dirty="0"/>
+          </a:p>
+        </p:txBody>
+      </p:sp>
+      <p:sp>
+        <p:nvSpPr>
+          <p:cNvPr id="3" name="Content Placeholder 2"/>
+          <p:cNvSpPr>
+            <a:spLocks noGrp="1"/>
+          </p:cNvSpPr>
+          <p:nvPr>
+            <p:ph idx="1"/>
+          </p:nvPr>
+        </p:nvSpPr>
+        <p:spPr>
+          <a:xfrm>
+            <a:off x="381000" y="1412875"/>
+            <a:ext cx="8382000" cy="3945696"/>
+          </a:xfrm>
+        </p:spPr>
+        <p:txBody>
+          <a:bodyPr/>
+          <a:lstStyle/>
+          <a:p>
+            <a:r>
+              <a:rPr lang="en-US" dirty="0" smtClean="0"/>
+              <a:t>Lambda functions (anonymous functions)</a:t>
+            </a:r>
+          </a:p>
+          <a:p>
+            <a:pPr lvl="1"/>
+            <a:r>
+              <a:rPr lang="en-US" dirty="0" smtClean="0"/>
+              <a:t>Functions with no name or identifier</a:t>
+            </a:r>
+          </a:p>
+          <a:p>
+            <a:pPr lvl="1"/>
+            <a:r>
+              <a:rPr lang="en-US" dirty="0" smtClean="0"/>
+              <a:t>Usually for higher level functions or to pass arguments to one</a:t>
+            </a:r>
+          </a:p>
+          <a:p>
+            <a:pPr lvl="1"/>
+            <a:r>
+              <a:rPr lang="en-US" dirty="0" smtClean="0"/>
+              <a:t>Usually used once to a few times</a:t>
+            </a:r>
+          </a:p>
+          <a:p>
+            <a:pPr lvl="1"/>
+            <a:r>
+              <a:rPr lang="en-US" dirty="0" smtClean="0"/>
+              <a:t>Can’t be recursive*</a:t>
+            </a:r>
+            <a:br>
+              <a:rPr lang="en-US" dirty="0" smtClean="0"/>
+            </a:br>
+            <a:r>
+              <a:rPr lang="en-US" dirty="0" smtClean="0"/>
+              <a:t/>
+            </a:r>
+            <a:br>
+              <a:rPr lang="en-US" dirty="0" smtClean="0"/>
+            </a:br>
+            <a:r>
+              <a:rPr lang="en-US" sz="1800" dirty="0" smtClean="0"/>
+              <a:t>* otherwise they need a name or some way of maintaining state**</a:t>
+            </a:r>
+            <a:br>
+              <a:rPr lang="en-US" sz="1800" dirty="0" smtClean="0"/>
+            </a:br>
+            <a:r>
+              <a:rPr lang="en-US" sz="1800" dirty="0" smtClean="0"/>
+              <a:t/>
+            </a:r>
+            <a:br>
+              <a:rPr lang="en-US" sz="1800" dirty="0" smtClean="0"/>
+            </a:br>
+            <a:r>
+              <a:rPr lang="en-US" sz="1800" dirty="0" smtClean="0"/>
+              <a:t>** which is possible but outside of this scope</a:t>
+            </a:r>
+            <a:endParaRPr lang="en-US" dirty="0" smtClean="0"/>
+          </a:p>
+        </p:txBody>
+      </p:sp>
+    </p:spTree>
+    <p:extLst>
+      <p:ext uri="{BB962C8B-B14F-4D97-AF65-F5344CB8AC3E}">
+        <p14:creationId xmlns:p14="http://schemas.microsoft.com/office/powerpoint/2010/main" val="2289279072"/>
       </p:ext>
     </p:extLst>
   </p:cSld>

</xml_diff>

<commit_message>
Embed fonts into presentation. (Fira Sans isn't included with OSs)
</commit_message>
<xml_diff>
--- a/A Primer on Functional Programming.pptx
+++ b/A Primer on Functional Programming.pptx
@@ -1,6 +1,6 @@
 
 <file path=ppt/presentation.xml><?xml version="1.0" encoding="utf-8"?>
-<p:presentation xmlns:a="http://schemas.openxmlformats.org/drawingml/2006/main" xmlns:r="http://schemas.openxmlformats.org/officeDocument/2006/relationships" xmlns:p="http://schemas.openxmlformats.org/presentationml/2006/main" saveSubsetFonts="1">
+<p:presentation xmlns:a="http://schemas.openxmlformats.org/drawingml/2006/main" xmlns:r="http://schemas.openxmlformats.org/officeDocument/2006/relationships" xmlns:p="http://schemas.openxmlformats.org/presentationml/2006/main" embedTrueTypeFonts="1">
   <p:sldMasterIdLst>
     <p:sldMasterId id="2147483660" r:id="rId1"/>
   </p:sldMasterIdLst>
@@ -41,6 +41,22 @@
   </p:sldIdLst>
   <p:sldSz cx="12192000" cy="6858000"/>
   <p:notesSz cx="6858000" cy="9144000"/>
+  <p:embeddedFontLst>
+    <p:embeddedFont>
+      <p:font typeface="Calibri" panose="020F0502020204030204" pitchFamily="34" charset="0"/>
+      <p:regular r:id="rId33"/>
+      <p:bold r:id="rId34"/>
+      <p:italic r:id="rId35"/>
+      <p:boldItalic r:id="rId36"/>
+    </p:embeddedFont>
+    <p:embeddedFont>
+      <p:font typeface="Fira Sans" panose="020B0503050000020004" pitchFamily="34" charset="0"/>
+      <p:regular r:id="rId37"/>
+      <p:bold r:id="rId38"/>
+      <p:italic r:id="rId39"/>
+      <p:boldItalic r:id="rId40"/>
+    </p:embeddedFont>
+  </p:embeddedFontLst>
   <p:defaultTextStyle>
     <a:defPPr>
       <a:defRPr lang="en-US"/>
@@ -229,7 +245,7 @@
           <a:p>
             <a:fld id="{480C794F-A920-4C5B-8271-520BB0AD5728}" type="datetimeFigureOut">
               <a:rPr lang="en-US" smtClean="0"/>
-              <a:t>5/21/2016</a:t>
+              <a:t>6/8/2016</a:t>
             </a:fld>
             <a:endParaRPr lang="en-US"/>
           </a:p>
@@ -883,11 +899,7 @@
             <a:pPr lvl="2"/>
             <a:r>
               <a:rPr lang="en-US" dirty="0" smtClean="0"/>
-              <a:t>Second </a:t>
-            </a:r>
-            <a:r>
-              <a:rPr lang="en-US" dirty="0" smtClean="0"/>
-              <a:t>level</a:t>
+              <a:t>Second level</a:t>
             </a:r>
           </a:p>
           <a:p>
@@ -2618,7 +2630,17 @@
                 <a:latin typeface="Fira Sans" panose="020B0503050000020004" pitchFamily="34" charset="0"/>
                 <a:ea typeface="Fira Sans" panose="020B0503050000020004" pitchFamily="34" charset="0"/>
               </a:rPr>
-              <a:t>selfconf</a:t>
+              <a:t>kcdc</a:t>
+            </a:r>
+            <a:r>
+              <a:rPr lang="en-US" i="1" dirty="0" smtClean="0">
+                <a:solidFill>
+                  <a:schemeClr val="bg1"/>
+                </a:solidFill>
+                <a:latin typeface="Fira Sans" panose="020B0503050000020004" pitchFamily="34" charset="0"/>
+                <a:ea typeface="Fira Sans" panose="020B0503050000020004" pitchFamily="34" charset="0"/>
+              </a:rPr>
+              <a:t> or #kcdc16 or something</a:t>
             </a:r>
             <a:endParaRPr lang="en-US" i="1" dirty="0">
               <a:solidFill>
@@ -2661,7 +2683,7 @@
           <a:spcPct val="0"/>
         </a:spcBef>
         <a:buNone/>
-        <a:defRPr sz="4800" kern="1200" spc="-120" baseline="0">
+        <a:defRPr sz="4000" kern="1200" spc="-120" baseline="0">
           <a:solidFill>
             <a:schemeClr val="bg1"/>
           </a:solidFill>
@@ -2680,8 +2702,8 @@
           <a:spcPts val="1300"/>
         </a:spcBef>
         <a:buFont typeface="Arial" pitchFamily="34" charset="0"/>
-        <a:buChar char=" "/>
-        <a:defRPr sz="2400" kern="1200">
+        <a:buChar char="•"/>
+        <a:defRPr sz="2800" kern="1200">
           <a:solidFill>
             <a:schemeClr val="bg1"/>
           </a:solidFill>
@@ -2699,7 +2721,7 @@
         </a:spcBef>
         <a:buFont typeface="Arial" pitchFamily="34" charset="0"/>
         <a:buChar char=" "/>
-        <a:defRPr sz="2400" kern="1200">
+        <a:defRPr sz="2800" kern="1200">
           <a:solidFill>
             <a:schemeClr val="bg1"/>
           </a:solidFill>
@@ -2717,7 +2739,7 @@
         </a:spcBef>
         <a:buFont typeface="Arial" pitchFamily="34" charset="0"/>
         <a:buChar char=" "/>
-        <a:defRPr sz="2000" i="1" kern="1200">
+        <a:defRPr sz="2400" i="1" kern="1200">
           <a:solidFill>
             <a:schemeClr val="bg1"/>
           </a:solidFill>
@@ -2735,7 +2757,7 @@
         </a:spcBef>
         <a:buFont typeface="Arial" pitchFamily="34" charset="0"/>
         <a:buChar char=" "/>
-        <a:defRPr sz="1800" kern="1200">
+        <a:defRPr sz="2000" kern="1200">
           <a:solidFill>
             <a:schemeClr val="bg1"/>
           </a:solidFill>
@@ -2753,7 +2775,7 @@
         </a:spcBef>
         <a:buFont typeface="Arial" pitchFamily="34" charset="0"/>
         <a:buChar char=" "/>
-        <a:defRPr sz="1800" kern="1200">
+        <a:defRPr sz="2000" kern="1200">
           <a:solidFill>
             <a:schemeClr val="bg1"/>
           </a:solidFill>
@@ -3723,7 +3745,9 @@
         </p:nvSpPr>
         <p:spPr/>
         <p:txBody>
-          <a:bodyPr/>
+          <a:bodyPr>
+            <a:normAutofit lnSpcReduction="10000"/>
+          </a:bodyPr>
           <a:lstStyle/>
           <a:p>
             <a:pPr marL="0" indent="0">
@@ -3930,7 +3954,6 @@
               <a:rPr lang="en-US" dirty="0"/>
               <a:t>)</a:t>
             </a:r>
-            <a:endParaRPr lang="en-US" dirty="0"/>
           </a:p>
         </p:txBody>
       </p:sp>
@@ -5159,7 +5182,7 @@
         <p:spPr/>
         <p:txBody>
           <a:bodyPr>
-            <a:normAutofit lnSpcReduction="10000"/>
+            <a:normAutofit fontScale="92500" lnSpcReduction="10000"/>
           </a:bodyPr>
           <a:lstStyle/>
           <a:p>
@@ -5759,7 +5782,7 @@
         <p:spPr/>
         <p:txBody>
           <a:bodyPr numCol="2">
-            <a:normAutofit/>
+            <a:normAutofit fontScale="92500" lnSpcReduction="10000"/>
           </a:bodyPr>
           <a:lstStyle/>
           <a:p>
@@ -7743,7 +7766,9 @@
         </p:nvSpPr>
         <p:spPr/>
         <p:txBody>
-          <a:bodyPr/>
+          <a:bodyPr>
+            <a:normAutofit fontScale="92500" lnSpcReduction="10000"/>
+          </a:bodyPr>
           <a:lstStyle/>
           <a:p>
             <a:r>
@@ -8693,7 +8718,6 @@
               <a:rPr lang="en-US" dirty="0"/>
               <a:t>Referential Transparency</a:t>
             </a:r>
-            <a:endParaRPr lang="en-US" dirty="0"/>
           </a:p>
         </p:txBody>
       </p:sp>

</xml_diff>

<commit_message>
Add fonts, remove MCC '18 redirect slide and hashtag
</commit_message>
<xml_diff>
--- a/A Primer on Functional Programming.pptx
+++ b/A Primer on Functional Programming.pptx
@@ -9,7 +9,7 @@
   </p:notesMasterIdLst>
   <p:sldIdLst>
     <p:sldId id="285" r:id="rId2"/>
-    <p:sldId id="284" r:id="rId3"/>
+    <p:sldId id="356" r:id="rId3"/>
     <p:sldId id="286" r:id="rId4"/>
     <p:sldId id="287" r:id="rId5"/>
     <p:sldId id="288" r:id="rId6"/>
@@ -312,7 +312,7 @@
         <p14:section name="0 - Intro" id="{393BB7E3-87F2-4578-AAE9-A9D996A7A10A}">
           <p14:sldIdLst>
             <p14:sldId id="285"/>
-            <p14:sldId id="284"/>
+            <p14:sldId id="356"/>
             <p14:sldId id="286"/>
             <p14:sldId id="287"/>
             <p14:sldId id="288"/>
@@ -2117,7 +2117,7 @@
     </p:spTree>
     <p:extLst>
       <p:ext uri="{BB962C8B-B14F-4D97-AF65-F5344CB8AC3E}">
-        <p14:creationId xmlns:p14="http://schemas.microsoft.com/office/powerpoint/2010/main" val="4186487277"/>
+        <p14:creationId xmlns:p14="http://schemas.microsoft.com/office/powerpoint/2010/main" val="1835897030"/>
       </p:ext>
     </p:extLst>
   </p:cSld>
@@ -19432,33 +19432,8 @@
                 <a:latin typeface="Fira Sans" panose="020B0503050000020004" pitchFamily="34" charset="0"/>
                 <a:ea typeface="Fira Sans" panose="020B0503050000020004" pitchFamily="34" charset="0"/>
               </a:rPr>
-              <a:t>@geekygirlsarah #</a:t>
+              <a:t>@geekygirlsarah</a:t>
             </a:r>
-            <a:r>
-              <a:rPr lang="en-US" sz="1600" b="1" i="1" dirty="0" err="1">
-                <a:solidFill>
-                  <a:schemeClr val="tx1">
-                    <a:lumMod val="65000"/>
-                    <a:lumOff val="35000"/>
-                  </a:schemeClr>
-                </a:solidFill>
-                <a:effectLst/>
-                <a:latin typeface="Fira Sans" panose="020B0503050000020004" pitchFamily="34" charset="0"/>
-                <a:ea typeface="Fira Sans" panose="020B0503050000020004" pitchFamily="34" charset="0"/>
-              </a:rPr>
-              <a:t>MusicCityCode</a:t>
-            </a:r>
-            <a:endParaRPr lang="en-US" sz="1600" b="1" i="1" dirty="0">
-              <a:solidFill>
-                <a:schemeClr val="tx1">
-                  <a:lumMod val="65000"/>
-                  <a:lumOff val="35000"/>
-                </a:schemeClr>
-              </a:solidFill>
-              <a:effectLst/>
-              <a:latin typeface="Fira Sans" panose="020B0503050000020004" pitchFamily="34" charset="0"/>
-              <a:ea typeface="Fira Sans" panose="020B0503050000020004" pitchFamily="34" charset="0"/>
-            </a:endParaRPr>
           </a:p>
         </p:txBody>
       </p:sp>
@@ -22772,33 +22747,8 @@
                 <a:latin typeface="Fira Sans" panose="020B0503050000020004" pitchFamily="34" charset="0"/>
                 <a:ea typeface="Fira Sans" panose="020B0503050000020004" pitchFamily="34" charset="0"/>
               </a:rPr>
-              <a:t>@geekygirlsarah #</a:t>
+              <a:t>@geekygirlsarah</a:t>
             </a:r>
-            <a:r>
-              <a:rPr lang="en-US" sz="1600" b="1" i="1" dirty="0" err="1">
-                <a:solidFill>
-                  <a:schemeClr val="tx1">
-                    <a:lumMod val="65000"/>
-                    <a:lumOff val="35000"/>
-                  </a:schemeClr>
-                </a:solidFill>
-                <a:effectLst/>
-                <a:latin typeface="Fira Sans" panose="020B0503050000020004" pitchFamily="34" charset="0"/>
-                <a:ea typeface="Fira Sans" panose="020B0503050000020004" pitchFamily="34" charset="0"/>
-              </a:rPr>
-              <a:t>MusicCityCode</a:t>
-            </a:r>
-            <a:endParaRPr lang="en-US" sz="1600" b="1" i="1" dirty="0">
-              <a:solidFill>
-                <a:schemeClr val="tx1">
-                  <a:lumMod val="65000"/>
-                  <a:lumOff val="35000"/>
-                </a:schemeClr>
-              </a:solidFill>
-              <a:effectLst/>
-              <a:latin typeface="Fira Sans" panose="020B0503050000020004" pitchFamily="34" charset="0"/>
-              <a:ea typeface="Fira Sans" panose="020B0503050000020004" pitchFamily="34" charset="0"/>
-            </a:endParaRPr>
           </a:p>
         </p:txBody>
       </p:sp>
@@ -25151,33 +25101,8 @@
                 <a:latin typeface="Fira Sans" panose="020B0503050000020004" pitchFamily="34" charset="0"/>
                 <a:ea typeface="Fira Sans" panose="020B0503050000020004" pitchFamily="34" charset="0"/>
               </a:rPr>
-              <a:t>@geekygirlsarah #</a:t>
+              <a:t>@geekygirlsarah</a:t>
             </a:r>
-            <a:r>
-              <a:rPr lang="en-US" sz="1600" b="1" i="1" dirty="0" err="1">
-                <a:solidFill>
-                  <a:schemeClr val="tx1">
-                    <a:lumMod val="65000"/>
-                    <a:lumOff val="35000"/>
-                  </a:schemeClr>
-                </a:solidFill>
-                <a:effectLst/>
-                <a:latin typeface="Fira Sans" panose="020B0503050000020004" pitchFamily="34" charset="0"/>
-                <a:ea typeface="Fira Sans" panose="020B0503050000020004" pitchFamily="34" charset="0"/>
-              </a:rPr>
-              <a:t>MusicCityCode</a:t>
-            </a:r>
-            <a:endParaRPr lang="en-US" sz="1600" b="1" i="1" dirty="0">
-              <a:solidFill>
-                <a:schemeClr val="tx1">
-                  <a:lumMod val="65000"/>
-                  <a:lumOff val="35000"/>
-                </a:schemeClr>
-              </a:solidFill>
-              <a:effectLst/>
-              <a:latin typeface="Fira Sans" panose="020B0503050000020004" pitchFamily="34" charset="0"/>
-              <a:ea typeface="Fira Sans" panose="020B0503050000020004" pitchFamily="34" charset="0"/>
-            </a:endParaRPr>
           </a:p>
         </p:txBody>
       </p:sp>
@@ -28293,33 +28218,8 @@
                 <a:latin typeface="Fira Sans" panose="020B0503050000020004" pitchFamily="34" charset="0"/>
                 <a:ea typeface="Fira Sans" panose="020B0503050000020004" pitchFamily="34" charset="0"/>
               </a:rPr>
-              <a:t>@geekygirlsarah #</a:t>
+              <a:t>@geekygirlsarah </a:t>
             </a:r>
-            <a:r>
-              <a:rPr lang="en-US" sz="1600" b="1" i="1" dirty="0" err="1">
-                <a:solidFill>
-                  <a:schemeClr val="tx1">
-                    <a:lumMod val="65000"/>
-                    <a:lumOff val="35000"/>
-                  </a:schemeClr>
-                </a:solidFill>
-                <a:effectLst/>
-                <a:latin typeface="Fira Sans" panose="020B0503050000020004" pitchFamily="34" charset="0"/>
-                <a:ea typeface="Fira Sans" panose="020B0503050000020004" pitchFamily="34" charset="0"/>
-              </a:rPr>
-              <a:t>MusicCityCode</a:t>
-            </a:r>
-            <a:endParaRPr lang="en-US" sz="1600" b="1" i="1" dirty="0">
-              <a:solidFill>
-                <a:schemeClr val="tx1">
-                  <a:lumMod val="65000"/>
-                  <a:lumOff val="35000"/>
-                </a:schemeClr>
-              </a:solidFill>
-              <a:effectLst/>
-              <a:latin typeface="Fira Sans" panose="020B0503050000020004" pitchFamily="34" charset="0"/>
-              <a:ea typeface="Fira Sans" panose="020B0503050000020004" pitchFamily="34" charset="0"/>
-            </a:endParaRPr>
           </a:p>
         </p:txBody>
       </p:sp>
@@ -31890,7 +31790,7 @@
     </p:spTree>
     <p:extLst>
       <p:ext uri="{BB962C8B-B14F-4D97-AF65-F5344CB8AC3E}">
-        <p14:creationId xmlns:p14="http://schemas.microsoft.com/office/powerpoint/2010/main" val="1648064718"/>
+        <p14:creationId xmlns:p14="http://schemas.microsoft.com/office/powerpoint/2010/main" val="2083154911"/>
       </p:ext>
     </p:extLst>
   </p:cSld>

</xml_diff>